<commit_message>
Made changes to notebook and presentation
</commit_message>
<xml_diff>
--- a/Lending Club case study.pptx
+++ b/Lending Club case study.pptx
@@ -11,18 +11,16 @@
     <p:sldId id="264" r:id="rId5"/>
     <p:sldId id="265" r:id="rId6"/>
     <p:sldId id="261" r:id="rId7"/>
-    <p:sldId id="267" r:id="rId8"/>
-    <p:sldId id="269" r:id="rId9"/>
-    <p:sldId id="270" r:id="rId10"/>
-    <p:sldId id="271" r:id="rId11"/>
-    <p:sldId id="272" r:id="rId12"/>
-    <p:sldId id="273" r:id="rId13"/>
-    <p:sldId id="262" r:id="rId14"/>
+    <p:sldId id="269" r:id="rId8"/>
+    <p:sldId id="271" r:id="rId9"/>
+    <p:sldId id="272" r:id="rId10"/>
+    <p:sldId id="273" r:id="rId11"/>
+    <p:sldId id="262" r:id="rId12"/>
   </p:sldIdLst>
   <p:sldSz cx="12192000" cy="6858000"/>
   <p:notesSz cx="6858000" cy="9144000"/>
   <p:custDataLst>
-    <p:tags r:id="rId15"/>
+    <p:tags r:id="rId13"/>
   </p:custDataLst>
   <p:defaultTextStyle>
     <a:defPPr>
@@ -353,7 +351,7 @@
           <a:p>
             <a:fld id="{3E15F4ED-4AA3-4EBF-8095-BB384D683934}" type="datetimeFigureOut">
               <a:rPr lang="en-US" smtClean="0"/>
-              <a:t>12/5/2022</a:t>
+              <a:t>12/7/2022</a:t>
             </a:fld>
             <a:endParaRPr lang="en-US"/>
           </a:p>
@@ -561,7 +559,7 @@
           <a:p>
             <a:fld id="{3E15F4ED-4AA3-4EBF-8095-BB384D683934}" type="datetimeFigureOut">
               <a:rPr lang="en-US" smtClean="0"/>
-              <a:t>12/5/2022</a:t>
+              <a:t>12/7/2022</a:t>
             </a:fld>
             <a:endParaRPr lang="en-US"/>
           </a:p>
@@ -817,7 +815,7 @@
           <a:p>
             <a:fld id="{3E15F4ED-4AA3-4EBF-8095-BB384D683934}" type="datetimeFigureOut">
               <a:rPr lang="en-US" smtClean="0"/>
-              <a:t>12/5/2022</a:t>
+              <a:t>12/7/2022</a:t>
             </a:fld>
             <a:endParaRPr lang="en-US"/>
           </a:p>
@@ -991,7 +989,7 @@
           <a:p>
             <a:fld id="{3E15F4ED-4AA3-4EBF-8095-BB384D683934}" type="datetimeFigureOut">
               <a:rPr lang="en-US" smtClean="0"/>
-              <a:t>12/5/2022</a:t>
+              <a:t>12/7/2022</a:t>
             </a:fld>
             <a:endParaRPr lang="en-US"/>
           </a:p>
@@ -1334,7 +1332,7 @@
           <a:p>
             <a:fld id="{3E15F4ED-4AA3-4EBF-8095-BB384D683934}" type="datetimeFigureOut">
               <a:rPr lang="en-US" smtClean="0"/>
-              <a:t>12/5/2022</a:t>
+              <a:t>12/7/2022</a:t>
             </a:fld>
             <a:endParaRPr lang="en-US"/>
           </a:p>
@@ -1609,7 +1607,7 @@
           <a:p>
             <a:fld id="{3E15F4ED-4AA3-4EBF-8095-BB384D683934}" type="datetimeFigureOut">
               <a:rPr lang="en-US" smtClean="0"/>
-              <a:t>12/5/2022</a:t>
+              <a:t>12/7/2022</a:t>
             </a:fld>
             <a:endParaRPr lang="en-US"/>
           </a:p>
@@ -1988,7 +1986,7 @@
           <a:p>
             <a:fld id="{3E15F4ED-4AA3-4EBF-8095-BB384D683934}" type="datetimeFigureOut">
               <a:rPr lang="en-US" smtClean="0"/>
-              <a:t>12/5/2022</a:t>
+              <a:t>12/7/2022</a:t>
             </a:fld>
             <a:endParaRPr lang="en-US"/>
           </a:p>
@@ -2106,7 +2104,7 @@
           <a:p>
             <a:fld id="{3E15F4ED-4AA3-4EBF-8095-BB384D683934}" type="datetimeFigureOut">
               <a:rPr lang="en-US" smtClean="0"/>
-              <a:t>12/5/2022</a:t>
+              <a:t>12/7/2022</a:t>
             </a:fld>
             <a:endParaRPr lang="en-US"/>
           </a:p>
@@ -2277,7 +2275,7 @@
           <a:p>
             <a:fld id="{3E15F4ED-4AA3-4EBF-8095-BB384D683934}" type="datetimeFigureOut">
               <a:rPr lang="en-US" smtClean="0"/>
-              <a:t>12/5/2022</a:t>
+              <a:t>12/7/2022</a:t>
             </a:fld>
             <a:endParaRPr lang="en-US"/>
           </a:p>
@@ -2631,7 +2629,7 @@
           <a:p>
             <a:fld id="{3E15F4ED-4AA3-4EBF-8095-BB384D683934}" type="datetimeFigureOut">
               <a:rPr lang="en-US" smtClean="0"/>
-              <a:t>12/5/2022</a:t>
+              <a:t>12/7/2022</a:t>
             </a:fld>
             <a:endParaRPr lang="en-US"/>
           </a:p>
@@ -3013,7 +3011,7 @@
           <a:p>
             <a:fld id="{3E15F4ED-4AA3-4EBF-8095-BB384D683934}" type="datetimeFigureOut">
               <a:rPr lang="en-US" smtClean="0"/>
-              <a:t>12/5/2022</a:t>
+              <a:t>12/7/2022</a:t>
             </a:fld>
             <a:endParaRPr lang="en-US"/>
           </a:p>
@@ -3300,7 +3298,7 @@
           <a:p>
             <a:fld id="{3E15F4ED-4AA3-4EBF-8095-BB384D683934}" type="datetimeFigureOut">
               <a:rPr lang="en-US" smtClean="0"/>
-              <a:t>12/5/2022</a:t>
+              <a:t>12/7/2022</a:t>
             </a:fld>
             <a:endParaRPr lang="en-US"/>
           </a:p>
@@ -4147,7 +4145,7 @@
           <a:p>
             <a:r>
               <a:rPr lang="en-US" dirty="0"/>
-              <a:t>Bi-variate and Segmented analysis</a:t>
+              <a:t>Feature Engineering</a:t>
             </a:r>
           </a:p>
         </p:txBody>
@@ -4167,7 +4165,7 @@
         <p:spPr>
           <a:xfrm>
             <a:off x="1141413" y="1828800"/>
-            <a:ext cx="10432966" cy="1282402"/>
+            <a:ext cx="10432966" cy="1682512"/>
           </a:xfrm>
           <a:prstGeom prst="rect">
             <a:avLst/>
@@ -4207,7 +4205,55 @@
                 </a:solidFill>
                 <a:latin typeface="-apple-system"/>
               </a:rPr>
-              <a:t>Loans taken for Small business has a high percentage of charge off's.</a:t>
+              <a:t>Calculated the difference amount of </a:t>
+            </a:r>
+            <a:r>
+              <a:rPr lang="en-US" sz="2000" dirty="0" err="1">
+                <a:solidFill>
+                  <a:schemeClr val="tx1">
+                    <a:lumMod val="75000"/>
+                    <a:lumOff val="25000"/>
+                  </a:schemeClr>
+                </a:solidFill>
+                <a:latin typeface="-apple-system"/>
+              </a:rPr>
+              <a:t>funded_amnt</a:t>
+            </a:r>
+            <a:r>
+              <a:rPr lang="en-US" sz="2000" dirty="0">
+                <a:solidFill>
+                  <a:schemeClr val="tx1">
+                    <a:lumMod val="75000"/>
+                    <a:lumOff val="25000"/>
+                  </a:schemeClr>
+                </a:solidFill>
+                <a:latin typeface="-apple-system"/>
+              </a:rPr>
+              <a:t> and </a:t>
+            </a:r>
+            <a:r>
+              <a:rPr lang="en-US" sz="2000" dirty="0" err="1">
+                <a:solidFill>
+                  <a:schemeClr val="tx1">
+                    <a:lumMod val="75000"/>
+                    <a:lumOff val="25000"/>
+                  </a:schemeClr>
+                </a:solidFill>
+                <a:latin typeface="-apple-system"/>
+              </a:rPr>
+              <a:t>funded_amnt_inv</a:t>
+            </a:r>
+            <a:r>
+              <a:rPr lang="en-US" sz="2000" dirty="0">
+                <a:solidFill>
+                  <a:schemeClr val="tx1">
+                    <a:lumMod val="75000"/>
+                    <a:lumOff val="25000"/>
+                  </a:schemeClr>
+                </a:solidFill>
+                <a:latin typeface="-apple-system"/>
+              </a:rPr>
+              <a:t>. Issuing more/less loan amount than approved amount doesn't have any effect on charged off.</a:t>
             </a:r>
           </a:p>
           <a:p>
@@ -4238,48 +4284,30 @@
                 </a:solidFill>
                 <a:latin typeface="-apple-system"/>
               </a:rPr>
-              <a:t>NE State has the highest charged-off percentage(almost 60 percent).</a:t>
-            </a:r>
-          </a:p>
-          <a:p>
-            <a:pPr marL="91440" indent="-91440" defTabSz="914400">
-              <a:lnSpc>
-                <a:spcPct val="90000"/>
-              </a:lnSpc>
-              <a:spcBef>
-                <a:spcPts val="1200"/>
-              </a:spcBef>
-              <a:spcAft>
-                <a:spcPts val="200"/>
-              </a:spcAft>
-              <a:buClr>
-                <a:schemeClr val="accent1"/>
-              </a:buClr>
-              <a:buSzPct val="100000"/>
+              <a:t>Calculated the percentage of installment in monthly income. If the Installment to Monthly income percentage is more than ~8%, the chances of charge off increases</a:t>
+            </a:r>
+          </a:p>
+          <a:p>
+            <a:pPr marL="285750" indent="-285750" algn="l">
               <a:buFont typeface="Wingdings" panose="05000000000000000000" pitchFamily="2" charset="2"/>
               <a:buChar char="Ø"/>
             </a:pPr>
-            <a:r>
-              <a:rPr lang="en-US" sz="2000" dirty="0">
-                <a:solidFill>
-                  <a:schemeClr val="tx1">
-                    <a:lumMod val="75000"/>
-                    <a:lumOff val="25000"/>
-                  </a:schemeClr>
-                </a:solidFill>
-                <a:latin typeface="-apple-system"/>
-              </a:rPr>
-              <a:t>CA State has a large number of charged-off loans</a:t>
-            </a:r>
+            <a:endParaRPr lang="en-US" b="0" i="0" dirty="0">
+              <a:solidFill>
+                <a:srgbClr val="000000"/>
+              </a:solidFill>
+              <a:effectLst/>
+              <a:latin typeface="Helvetica Neue"/>
+            </a:endParaRPr>
           </a:p>
         </p:txBody>
       </p:sp>
       <p:pic>
         <p:nvPicPr>
-          <p:cNvPr id="7" name="Picture 6">
+          <p:cNvPr id="5" name="Picture 4">
             <a:extLst>
               <a:ext uri="{FF2B5EF4-FFF2-40B4-BE49-F238E27FC236}">
-                <a16:creationId xmlns:a16="http://schemas.microsoft.com/office/drawing/2014/main" id="{F86ED286-77E3-2668-2664-2E0AC9AA1491}"/>
+                <a16:creationId xmlns:a16="http://schemas.microsoft.com/office/drawing/2014/main" id="{4D41D004-CA15-B03A-0264-C4910C4119A6}"/>
               </a:ext>
             </a:extLst>
           </p:cNvPr>
@@ -4296,38 +4324,8 @@
         </p:blipFill>
         <p:spPr>
           <a:xfrm>
-            <a:off x="1141414" y="3084681"/>
-            <a:ext cx="3959976" cy="3228608"/>
-          </a:xfrm>
-          <a:prstGeom prst="rect">
-            <a:avLst/>
-          </a:prstGeom>
-        </p:spPr>
-      </p:pic>
-      <p:pic>
-        <p:nvPicPr>
-          <p:cNvPr id="9" name="Picture 8">
-            <a:extLst>
-              <a:ext uri="{FF2B5EF4-FFF2-40B4-BE49-F238E27FC236}">
-                <a16:creationId xmlns:a16="http://schemas.microsoft.com/office/drawing/2014/main" id="{1585E62A-9A90-8517-A4C9-8C74CCA6F511}"/>
-              </a:ext>
-            </a:extLst>
-          </p:cNvPr>
-          <p:cNvPicPr>
-            <a:picLocks noChangeAspect="1"/>
-          </p:cNvPicPr>
-          <p:nvPr/>
-        </p:nvPicPr>
-        <p:blipFill>
-          <a:blip r:embed="rId6"/>
-          <a:stretch>
-            <a:fillRect/>
-          </a:stretch>
-        </p:blipFill>
-        <p:spPr>
-          <a:xfrm>
-            <a:off x="5722363" y="3101054"/>
-            <a:ext cx="4199679" cy="3060691"/>
+            <a:off x="3888411" y="3306128"/>
+            <a:ext cx="3531063" cy="2904777"/>
           </a:xfrm>
           <a:prstGeom prst="rect">
             <a:avLst/>
@@ -4337,7 +4335,7 @@
     </p:spTree>
     <p:extLst>
       <p:ext uri="{BB962C8B-B14F-4D97-AF65-F5344CB8AC3E}">
-        <p14:creationId xmlns:p14="http://schemas.microsoft.com/office/powerpoint/2010/main" val="2903740383"/>
+        <p14:creationId xmlns:p14="http://schemas.microsoft.com/office/powerpoint/2010/main" val="1056192473"/>
       </p:ext>
     </p:extLst>
   </p:cSld>
@@ -4461,231 +4459,149 @@
           <a:p>
             <a:r>
               <a:rPr lang="en-US" dirty="0"/>
-              <a:t>Bi-variate and Segmented analysis</a:t>
-            </a:r>
-          </a:p>
-        </p:txBody>
-      </p:sp>
-      <p:sp>
-        <p:nvSpPr>
-          <p:cNvPr id="6" name="TextBox 5">
+              <a:t>Conclusion</a:t>
+            </a:r>
+          </a:p>
+        </p:txBody>
+      </p:sp>
+      <p:sp>
+        <p:nvSpPr>
+          <p:cNvPr id="3" name="Content Placeholder 2">
             <a:extLst>
               <a:ext uri="{FF2B5EF4-FFF2-40B4-BE49-F238E27FC236}">
-                <a16:creationId xmlns:a16="http://schemas.microsoft.com/office/drawing/2014/main" id="{239E8D74-F2DF-D6A9-55B8-9A440D49D8D7}"/>
+                <a16:creationId xmlns:a16="http://schemas.microsoft.com/office/drawing/2014/main" id="{31A57B99-F244-461F-A4E9-BA616D17E424}"/>
               </a:ext>
             </a:extLst>
           </p:cNvPr>
-          <p:cNvSpPr txBox="1"/>
-          <p:nvPr/>
-        </p:nvSpPr>
-        <p:spPr>
-          <a:xfrm>
-            <a:off x="1141413" y="1828800"/>
-            <a:ext cx="10432966" cy="1282402"/>
-          </a:xfrm>
-          <a:prstGeom prst="rect">
-            <a:avLst/>
-          </a:prstGeom>
-          <a:noFill/>
-        </p:spPr>
-        <p:txBody>
-          <a:bodyPr wrap="square" rtlCol="0">
-            <a:spAutoFit/>
-          </a:bodyPr>
+          <p:cNvSpPr>
+            <a:spLocks noGrp="1"/>
+          </p:cNvSpPr>
+          <p:nvPr>
+            <p:ph idx="1"/>
+          </p:nvPr>
+        </p:nvSpPr>
+        <p:spPr>
+          <a:xfrm>
+            <a:off x="1141413" y="1296140"/>
+            <a:ext cx="9905998" cy="4495061"/>
+          </a:xfrm>
+        </p:spPr>
+        <p:txBody>
+          <a:bodyPr/>
           <a:lstStyle/>
           <a:p>
-            <a:pPr marL="91440" indent="-91440" defTabSz="914400">
-              <a:lnSpc>
-                <a:spcPct val="90000"/>
-              </a:lnSpc>
-              <a:spcBef>
-                <a:spcPts val="1200"/>
-              </a:spcBef>
-              <a:spcAft>
-                <a:spcPts val="200"/>
-              </a:spcAft>
-              <a:buClr>
-                <a:schemeClr val="accent1"/>
-              </a:buClr>
-              <a:buSzPct val="100000"/>
+            <a:pPr marL="0" indent="0">
+              <a:buNone/>
+            </a:pPr>
+            <a:r>
+              <a:rPr lang="en-US" dirty="0">
+                <a:latin typeface="Calibri" panose="020F0502020204030204" pitchFamily="34" charset="0"/>
+                <a:cs typeface="Calibri" panose="020F0502020204030204" pitchFamily="34" charset="0"/>
+              </a:rPr>
+              <a:t>Lending club can consider below factors to decrease the Charge off percentage.</a:t>
+            </a:r>
+          </a:p>
+          <a:p>
+            <a:pPr>
               <a:buFont typeface="Wingdings" panose="05000000000000000000" pitchFamily="2" charset="2"/>
               <a:buChar char="Ø"/>
             </a:pPr>
             <a:r>
-              <a:rPr lang="en-US" sz="2000" dirty="0">
-                <a:solidFill>
-                  <a:schemeClr val="tx1">
-                    <a:lumMod val="75000"/>
-                    <a:lumOff val="25000"/>
-                  </a:schemeClr>
-                </a:solidFill>
-                <a:latin typeface="-apple-system"/>
+              <a:rPr lang="en-US" dirty="0">
+                <a:latin typeface="Calibri" panose="020F0502020204030204" pitchFamily="34" charset="0"/>
+                <a:cs typeface="Calibri" panose="020F0502020204030204" pitchFamily="34" charset="0"/>
               </a:rPr>
-              <a:t>If </a:t>
-            </a:r>
-            <a:r>
-              <a:rPr lang="en-US" sz="2000" dirty="0" err="1">
-                <a:solidFill>
-                  <a:schemeClr val="tx1">
-                    <a:lumMod val="75000"/>
-                    <a:lumOff val="25000"/>
-                  </a:schemeClr>
-                </a:solidFill>
-                <a:latin typeface="-apple-system"/>
-              </a:rPr>
-              <a:t>pub_rec_bankruptcies</a:t>
-            </a:r>
-            <a:r>
-              <a:rPr lang="en-US" sz="2000" dirty="0">
-                <a:solidFill>
-                  <a:schemeClr val="tx1">
-                    <a:lumMod val="75000"/>
-                    <a:lumOff val="25000"/>
-                  </a:schemeClr>
-                </a:solidFill>
-                <a:latin typeface="-apple-system"/>
-              </a:rPr>
-              <a:t> is high then also there is more chance of being Charged off.</a:t>
-            </a:r>
-          </a:p>
-          <a:p>
-            <a:pPr marL="91440" indent="-91440" defTabSz="914400">
-              <a:lnSpc>
-                <a:spcPct val="90000"/>
-              </a:lnSpc>
-              <a:spcBef>
-                <a:spcPts val="1200"/>
-              </a:spcBef>
-              <a:spcAft>
-                <a:spcPts val="200"/>
-              </a:spcAft>
-              <a:buClr>
-                <a:schemeClr val="accent1"/>
-              </a:buClr>
-              <a:buSzPct val="100000"/>
+              <a:t>If lending club reduce the interest rates there will be less chance of charge off’s.</a:t>
+            </a:r>
+          </a:p>
+          <a:p>
+            <a:pPr>
               <a:buFont typeface="Wingdings" panose="05000000000000000000" pitchFamily="2" charset="2"/>
               <a:buChar char="Ø"/>
             </a:pPr>
             <a:r>
-              <a:rPr lang="en-US" sz="2000" dirty="0">
-                <a:solidFill>
-                  <a:schemeClr val="tx1">
-                    <a:lumMod val="75000"/>
-                    <a:lumOff val="25000"/>
-                  </a:schemeClr>
-                </a:solidFill>
-                <a:latin typeface="-apple-system"/>
+              <a:rPr lang="en-US" dirty="0">
+                <a:latin typeface="Calibri" panose="020F0502020204030204" pitchFamily="34" charset="0"/>
+                <a:cs typeface="Calibri" panose="020F0502020204030204" pitchFamily="34" charset="0"/>
               </a:rPr>
-              <a:t>Charge-off percentage is slightly high(~2-4) for DTI range is between 15 to 27.</a:t>
-            </a:r>
-          </a:p>
-          <a:p>
-            <a:pPr marL="91440" indent="-91440" defTabSz="914400">
-              <a:lnSpc>
-                <a:spcPct val="90000"/>
-              </a:lnSpc>
-              <a:spcBef>
-                <a:spcPts val="1200"/>
-              </a:spcBef>
-              <a:spcAft>
-                <a:spcPts val="200"/>
-              </a:spcAft>
-              <a:buClr>
-                <a:schemeClr val="accent1"/>
-              </a:buClr>
-              <a:buSzPct val="100000"/>
+              <a:t>Should issue loans carefully for certain grades which has higher charge off percentage.</a:t>
+            </a:r>
+          </a:p>
+          <a:p>
+            <a:pPr>
               <a:buFont typeface="Wingdings" panose="05000000000000000000" pitchFamily="2" charset="2"/>
               <a:buChar char="Ø"/>
             </a:pPr>
             <a:r>
-              <a:rPr lang="en-US" sz="2000" dirty="0">
-                <a:solidFill>
-                  <a:schemeClr val="tx1">
-                    <a:lumMod val="75000"/>
-                    <a:lumOff val="25000"/>
-                  </a:schemeClr>
-                </a:solidFill>
-                <a:latin typeface="-apple-system"/>
+              <a:rPr lang="en-US" dirty="0">
+                <a:latin typeface="Calibri" panose="020F0502020204030204" pitchFamily="34" charset="0"/>
+                <a:cs typeface="Calibri" panose="020F0502020204030204" pitchFamily="34" charset="0"/>
               </a:rPr>
-              <a:t>Charge-off is slightly high if the loan amount is greater than 30K</a:t>
-            </a:r>
-            <a:r>
-              <a:rPr lang="en-US" b="0" i="0" dirty="0">
-                <a:solidFill>
-                  <a:srgbClr val="000000"/>
-                </a:solidFill>
-                <a:effectLst/>
-                <a:latin typeface="Helvetica Neue"/>
+              <a:t>Should issue loans carefully to people from NE state as they have ~60% charge off’s.</a:t>
+            </a:r>
+          </a:p>
+          <a:p>
+            <a:pPr>
+              <a:buFont typeface="Wingdings" panose="05000000000000000000" pitchFamily="2" charset="2"/>
+              <a:buChar char="Ø"/>
+            </a:pPr>
+            <a:r>
+              <a:rPr lang="en-US" dirty="0">
+                <a:latin typeface="Calibri" panose="020F0502020204030204" pitchFamily="34" charset="0"/>
+                <a:cs typeface="Calibri" panose="020F0502020204030204" pitchFamily="34" charset="0"/>
               </a:rPr>
-              <a:t>.</a:t>
-            </a:r>
-          </a:p>
-        </p:txBody>
-      </p:sp>
-      <p:pic>
-        <p:nvPicPr>
-          <p:cNvPr id="7" name="Picture 6">
-            <a:extLst>
-              <a:ext uri="{FF2B5EF4-FFF2-40B4-BE49-F238E27FC236}">
-                <a16:creationId xmlns:a16="http://schemas.microsoft.com/office/drawing/2014/main" id="{3AFA13B6-C159-94C5-BD97-7D573FC9057A}"/>
-              </a:ext>
-            </a:extLst>
-          </p:cNvPr>
-          <p:cNvPicPr>
-            <a:picLocks noChangeAspect="1"/>
-          </p:cNvPicPr>
-          <p:nvPr/>
-        </p:nvPicPr>
-        <p:blipFill>
-          <a:blip r:embed="rId5"/>
-          <a:stretch>
-            <a:fillRect/>
-          </a:stretch>
-        </p:blipFill>
-        <p:spPr>
-          <a:xfrm>
-            <a:off x="1029119" y="3074092"/>
-            <a:ext cx="4393113" cy="3174308"/>
-          </a:xfrm>
-          <a:prstGeom prst="rect">
-            <a:avLst/>
-          </a:prstGeom>
-        </p:spPr>
-      </p:pic>
-      <p:pic>
-        <p:nvPicPr>
-          <p:cNvPr id="9" name="Picture 8">
-            <a:extLst>
-              <a:ext uri="{FF2B5EF4-FFF2-40B4-BE49-F238E27FC236}">
-                <a16:creationId xmlns:a16="http://schemas.microsoft.com/office/drawing/2014/main" id="{57F1D1E2-8FA3-04A5-1E65-476D866A4D9C}"/>
-              </a:ext>
-            </a:extLst>
-          </p:cNvPr>
-          <p:cNvPicPr>
-            <a:picLocks noChangeAspect="1"/>
-          </p:cNvPicPr>
-          <p:nvPr/>
-        </p:nvPicPr>
-        <p:blipFill>
-          <a:blip r:embed="rId6"/>
-          <a:stretch>
-            <a:fillRect/>
-          </a:stretch>
-        </p:blipFill>
-        <p:spPr>
-          <a:xfrm>
-            <a:off x="6174623" y="3108989"/>
-            <a:ext cx="3851694" cy="3078400"/>
-          </a:xfrm>
-          <a:prstGeom prst="rect">
-            <a:avLst/>
-          </a:prstGeom>
-        </p:spPr>
-      </p:pic>
+              <a:t>As people who took loan for small business has high chance of charge off, should be cautious while issuing loans to small business.</a:t>
+            </a:r>
+          </a:p>
+          <a:p>
+            <a:pPr>
+              <a:buFont typeface="Wingdings" panose="05000000000000000000" pitchFamily="2" charset="2"/>
+              <a:buChar char="Ø"/>
+            </a:pPr>
+            <a:r>
+              <a:rPr lang="en-US" dirty="0">
+                <a:latin typeface="Calibri" panose="020F0502020204030204" pitchFamily="34" charset="0"/>
+                <a:cs typeface="Calibri" panose="020F0502020204030204" pitchFamily="34" charset="0"/>
+              </a:rPr>
+              <a:t>Should also reduce the number of loan for CA State as it has more number of charge off’s.</a:t>
+            </a:r>
+          </a:p>
+          <a:p>
+            <a:pPr>
+              <a:buFont typeface="Wingdings" panose="05000000000000000000" pitchFamily="2" charset="2"/>
+              <a:buChar char="Ø"/>
+            </a:pPr>
+            <a:endParaRPr lang="en-US" dirty="0">
+              <a:latin typeface="Calibri" panose="020F0502020204030204" pitchFamily="34" charset="0"/>
+              <a:cs typeface="Calibri" panose="020F0502020204030204" pitchFamily="34" charset="0"/>
+            </a:endParaRPr>
+          </a:p>
+          <a:p>
+            <a:pPr>
+              <a:buFont typeface="Wingdings" panose="05000000000000000000" pitchFamily="2" charset="2"/>
+              <a:buChar char="Ø"/>
+            </a:pPr>
+            <a:endParaRPr lang="en-US" dirty="0">
+              <a:latin typeface="Calibri" panose="020F0502020204030204" pitchFamily="34" charset="0"/>
+              <a:cs typeface="Calibri" panose="020F0502020204030204" pitchFamily="34" charset="0"/>
+            </a:endParaRPr>
+          </a:p>
+          <a:p>
+            <a:pPr>
+              <a:buFont typeface="Wingdings" panose="05000000000000000000" pitchFamily="2" charset="2"/>
+              <a:buChar char="Ø"/>
+            </a:pPr>
+            <a:endParaRPr lang="en-US" dirty="0">
+              <a:latin typeface="Calibri" panose="020F0502020204030204" pitchFamily="34" charset="0"/>
+              <a:cs typeface="Calibri" panose="020F0502020204030204" pitchFamily="34" charset="0"/>
+            </a:endParaRPr>
+          </a:p>
+        </p:txBody>
+      </p:sp>
     </p:spTree>
     <p:extLst>
       <p:ext uri="{BB962C8B-B14F-4D97-AF65-F5344CB8AC3E}">
-        <p14:creationId xmlns:p14="http://schemas.microsoft.com/office/powerpoint/2010/main" val="1853931200"/>
+        <p14:creationId xmlns:p14="http://schemas.microsoft.com/office/powerpoint/2010/main" val="2392271692"/>
       </p:ext>
     </p:extLst>
   </p:cSld>
@@ -4695,7 +4611,7 @@
 </p:sld>
 </file>
 
-<file path=ppt/slides/slide12.xml><?xml version="1.0" encoding="utf-8"?>
+<file path=ppt/slides/slide2.xml><?xml version="1.0" encoding="utf-8"?>
 <p:sld xmlns:a="http://schemas.openxmlformats.org/drawingml/2006/main" xmlns:r="http://schemas.openxmlformats.org/officeDocument/2006/relationships" xmlns:p="http://schemas.openxmlformats.org/presentationml/2006/main">
   <p:cSld>
     <p:spTree>
@@ -4728,6 +4644,223 @@
             <p:custDataLst>
               <p:tags r:id="rId1"/>
             </p:custDataLst>
+            <p:extLst>
+              <p:ext uri="{D42A27DB-BD31-4B8C-83A1-F6EECF244321}">
+                <p14:modId xmlns:p14="http://schemas.microsoft.com/office/powerpoint/2010/main" val="1951031672"/>
+              </p:ext>
+            </p:extLst>
+          </p:nvPr>
+        </p:nvGraphicFramePr>
+        <p:xfrm>
+          <a:off x="1588" y="1588"/>
+          <a:ext cx="1588" cy="1588"/>
+        </p:xfrm>
+        <a:graphic>
+          <a:graphicData uri="http://schemas.openxmlformats.org/presentationml/2006/ole">
+            <mc:AlternateContent xmlns:mc="http://schemas.openxmlformats.org/markup-compatibility/2006">
+              <mc:Choice xmlns:v="urn:schemas-microsoft-com:vml" Requires="v">
+                <p:oleObj name="think-cell Slide" r:id="rId3" imgW="473" imgH="473" progId="TCLayout.ActiveDocument.1">
+                  <p:embed/>
+                </p:oleObj>
+              </mc:Choice>
+              <mc:Fallback>
+                <p:oleObj name="think-cell Slide" r:id="rId3" imgW="473" imgH="473" progId="TCLayout.ActiveDocument.1">
+                  <p:embed/>
+                  <p:pic>
+                    <p:nvPicPr>
+                      <p:cNvPr id="0" name=""/>
+                      <p:cNvPicPr/>
+                      <p:nvPr/>
+                    </p:nvPicPr>
+                    <p:blipFill>
+                      <a:blip r:embed="rId4"/>
+                      <a:stretch>
+                        <a:fillRect/>
+                      </a:stretch>
+                    </p:blipFill>
+                    <p:spPr>
+                      <a:xfrm>
+                        <a:off x="1588" y="1588"/>
+                        <a:ext cx="1588" cy="1588"/>
+                      </a:xfrm>
+                      <a:prstGeom prst="rect">
+                        <a:avLst/>
+                      </a:prstGeom>
+                    </p:spPr>
+                  </p:pic>
+                </p:oleObj>
+              </mc:Fallback>
+            </mc:AlternateContent>
+          </a:graphicData>
+        </a:graphic>
+      </p:graphicFrame>
+      <p:sp>
+        <p:nvSpPr>
+          <p:cNvPr id="2" name="Title 1">
+            <a:extLst>
+              <a:ext uri="{FF2B5EF4-FFF2-40B4-BE49-F238E27FC236}">
+                <a16:creationId xmlns:a16="http://schemas.microsoft.com/office/drawing/2014/main" id="{109596E1-A18E-4397-8DCE-778F5C1FB128}"/>
+              </a:ext>
+            </a:extLst>
+          </p:cNvPr>
+          <p:cNvSpPr>
+            <a:spLocks noGrp="1"/>
+          </p:cNvSpPr>
+          <p:nvPr>
+            <p:ph type="title"/>
+          </p:nvPr>
+        </p:nvSpPr>
+        <p:spPr>
+          <a:xfrm>
+            <a:off x="1141413" y="364218"/>
+            <a:ext cx="9905998" cy="686540"/>
+          </a:xfrm>
+        </p:spPr>
+        <p:txBody>
+          <a:bodyPr vert="horz">
+            <a:normAutofit fontScale="90000"/>
+          </a:bodyPr>
+          <a:lstStyle/>
+          <a:p>
+            <a:r>
+              <a:rPr lang="en-US" dirty="0"/>
+              <a:t>Case Study Summary</a:t>
+            </a:r>
+          </a:p>
+        </p:txBody>
+      </p:sp>
+      <p:sp>
+        <p:nvSpPr>
+          <p:cNvPr id="3" name="Content Placeholder 2">
+            <a:extLst>
+              <a:ext uri="{FF2B5EF4-FFF2-40B4-BE49-F238E27FC236}">
+                <a16:creationId xmlns:a16="http://schemas.microsoft.com/office/drawing/2014/main" id="{31A57B99-F244-461F-A4E9-BA616D17E424}"/>
+              </a:ext>
+            </a:extLst>
+          </p:cNvPr>
+          <p:cNvSpPr>
+            <a:spLocks noGrp="1"/>
+          </p:cNvSpPr>
+          <p:nvPr>
+            <p:ph idx="1"/>
+          </p:nvPr>
+        </p:nvSpPr>
+        <p:spPr>
+          <a:xfrm>
+            <a:off x="1141413" y="1296140"/>
+            <a:ext cx="9905998" cy="4495061"/>
+          </a:xfrm>
+        </p:spPr>
+        <p:txBody>
+          <a:bodyPr/>
+          <a:lstStyle/>
+          <a:p>
+            <a:r>
+              <a:rPr lang="en-US" dirty="0">
+                <a:latin typeface="Calibri" panose="020F0502020204030204" pitchFamily="34" charset="0"/>
+                <a:cs typeface="Calibri" panose="020F0502020204030204" pitchFamily="34" charset="0"/>
+              </a:rPr>
+              <a:t>Built understanding of the objective, different features and  their data types</a:t>
+            </a:r>
+          </a:p>
+          <a:p>
+            <a:r>
+              <a:rPr lang="en-US" dirty="0">
+                <a:latin typeface="Calibri" panose="020F0502020204030204" pitchFamily="34" charset="0"/>
+                <a:cs typeface="Calibri" panose="020F0502020204030204" pitchFamily="34" charset="0"/>
+              </a:rPr>
+              <a:t>addressed the data quality issues including missing values, outliers and redundant features </a:t>
+            </a:r>
+          </a:p>
+          <a:p>
+            <a:r>
+              <a:rPr lang="en-US" dirty="0">
+                <a:latin typeface="Calibri" panose="020F0502020204030204" pitchFamily="34" charset="0"/>
+                <a:cs typeface="Calibri" panose="020F0502020204030204" pitchFamily="34" charset="0"/>
+              </a:rPr>
+              <a:t>Univariate analysis of categorial and continuous variables and their relationship with loan status</a:t>
+            </a:r>
+          </a:p>
+          <a:p>
+            <a:r>
+              <a:rPr lang="en-US" dirty="0">
+                <a:latin typeface="Calibri" panose="020F0502020204030204" pitchFamily="34" charset="0"/>
+                <a:cs typeface="Calibri" panose="020F0502020204030204" pitchFamily="34" charset="0"/>
+              </a:rPr>
+              <a:t>Derived new features from the data as per the domain understanding </a:t>
+            </a:r>
+          </a:p>
+          <a:p>
+            <a:r>
+              <a:rPr lang="en-US" dirty="0">
+                <a:latin typeface="Calibri" panose="020F0502020204030204" pitchFamily="34" charset="0"/>
+                <a:cs typeface="Calibri" panose="020F0502020204030204" pitchFamily="34" charset="0"/>
+              </a:rPr>
+              <a:t>Bivariate analysis and segmented analysis to understand the relationship between different features</a:t>
+            </a:r>
+          </a:p>
+          <a:p>
+            <a:r>
+              <a:rPr lang="en-US" dirty="0">
+                <a:latin typeface="Calibri" panose="020F0502020204030204" pitchFamily="34" charset="0"/>
+                <a:cs typeface="Calibri" panose="020F0502020204030204" pitchFamily="34" charset="0"/>
+              </a:rPr>
+              <a:t>Identified significant metrics in identifying default</a:t>
+            </a:r>
+          </a:p>
+        </p:txBody>
+      </p:sp>
+    </p:spTree>
+    <p:extLst>
+      <p:ext uri="{BB962C8B-B14F-4D97-AF65-F5344CB8AC3E}">
+        <p14:creationId xmlns:p14="http://schemas.microsoft.com/office/powerpoint/2010/main" val="3963955110"/>
+      </p:ext>
+    </p:extLst>
+  </p:cSld>
+  <p:clrMapOvr>
+    <a:masterClrMapping/>
+  </p:clrMapOvr>
+</p:sld>
+</file>
+
+<file path=ppt/slides/slide3.xml><?xml version="1.0" encoding="utf-8"?>
+<p:sld xmlns:a="http://schemas.openxmlformats.org/drawingml/2006/main" xmlns:r="http://schemas.openxmlformats.org/officeDocument/2006/relationships" xmlns:p="http://schemas.openxmlformats.org/presentationml/2006/main">
+  <p:cSld>
+    <p:spTree>
+      <p:nvGrpSpPr>
+        <p:cNvPr id="1" name=""/>
+        <p:cNvGrpSpPr/>
+        <p:nvPr/>
+      </p:nvGrpSpPr>
+      <p:grpSpPr>
+        <a:xfrm>
+          <a:off x="0" y="0"/>
+          <a:ext cx="0" cy="0"/>
+          <a:chOff x="0" y="0"/>
+          <a:chExt cx="0" cy="0"/>
+        </a:xfrm>
+      </p:grpSpPr>
+      <p:graphicFrame>
+        <p:nvGraphicFramePr>
+          <p:cNvPr id="4" name="Object 3" hidden="1">
+            <a:extLst>
+              <a:ext uri="{FF2B5EF4-FFF2-40B4-BE49-F238E27FC236}">
+                <a16:creationId xmlns:a16="http://schemas.microsoft.com/office/drawing/2014/main" id="{D6C5948B-EBDC-4BC7-B296-690BCA97CA05}"/>
+              </a:ext>
+            </a:extLst>
+          </p:cNvPr>
+          <p:cNvGraphicFramePr>
+            <a:graphicFrameLocks noChangeAspect="1"/>
+          </p:cNvGraphicFramePr>
+          <p:nvPr>
+            <p:custDataLst>
+              <p:tags r:id="rId1"/>
+            </p:custDataLst>
+            <p:extLst>
+              <p:ext uri="{D42A27DB-BD31-4B8C-83A1-F6EECF244321}">
+                <p14:modId xmlns:p14="http://schemas.microsoft.com/office/powerpoint/2010/main" val="1553655526"/>
+              </p:ext>
+            </p:extLst>
           </p:nvPr>
         </p:nvGraphicFramePr>
         <p:xfrm>
@@ -4797,7 +4930,7 @@
         </p:nvSpPr>
         <p:spPr>
           <a:xfrm>
-            <a:off x="1141413" y="609600"/>
+            <a:off x="1141413" y="336885"/>
             <a:ext cx="9905998" cy="686540"/>
           </a:xfrm>
         </p:spPr>
@@ -4809,197 +4942,131 @@
           <a:p>
             <a:r>
               <a:rPr lang="en-US" dirty="0"/>
-              <a:t>Feature Engineering</a:t>
-            </a:r>
-          </a:p>
-        </p:txBody>
-      </p:sp>
-      <p:sp>
-        <p:nvSpPr>
-          <p:cNvPr id="6" name="TextBox 5">
+              <a:t>Data Cleaning and manipulation</a:t>
+            </a:r>
+          </a:p>
+        </p:txBody>
+      </p:sp>
+      <p:sp>
+        <p:nvSpPr>
+          <p:cNvPr id="3" name="Content Placeholder 2">
             <a:extLst>
               <a:ext uri="{FF2B5EF4-FFF2-40B4-BE49-F238E27FC236}">
-                <a16:creationId xmlns:a16="http://schemas.microsoft.com/office/drawing/2014/main" id="{239E8D74-F2DF-D6A9-55B8-9A440D49D8D7}"/>
+                <a16:creationId xmlns:a16="http://schemas.microsoft.com/office/drawing/2014/main" id="{31A57B99-F244-461F-A4E9-BA616D17E424}"/>
               </a:ext>
             </a:extLst>
           </p:cNvPr>
-          <p:cNvSpPr txBox="1"/>
-          <p:nvPr/>
-        </p:nvSpPr>
-        <p:spPr>
-          <a:xfrm>
-            <a:off x="1141413" y="1828800"/>
-            <a:ext cx="10432966" cy="1682512"/>
-          </a:xfrm>
-          <a:prstGeom prst="rect">
-            <a:avLst/>
-          </a:prstGeom>
-          <a:noFill/>
-        </p:spPr>
-        <p:txBody>
-          <a:bodyPr wrap="square" rtlCol="0">
-            <a:spAutoFit/>
-          </a:bodyPr>
+          <p:cNvSpPr>
+            <a:spLocks noGrp="1"/>
+          </p:cNvSpPr>
+          <p:nvPr>
+            <p:ph idx="1"/>
+          </p:nvPr>
+        </p:nvSpPr>
+        <p:spPr>
+          <a:xfrm>
+            <a:off x="1141413" y="1296140"/>
+            <a:ext cx="9905998" cy="2794597"/>
+          </a:xfrm>
+        </p:spPr>
+        <p:txBody>
+          <a:bodyPr/>
           <a:lstStyle/>
           <a:p>
-            <a:pPr marL="91440" indent="-91440" defTabSz="914400">
-              <a:lnSpc>
-                <a:spcPct val="90000"/>
-              </a:lnSpc>
-              <a:spcBef>
-                <a:spcPts val="1200"/>
-              </a:spcBef>
-              <a:spcAft>
-                <a:spcPts val="200"/>
-              </a:spcAft>
-              <a:buClr>
-                <a:schemeClr val="accent1"/>
-              </a:buClr>
-              <a:buSzPct val="100000"/>
-              <a:buFont typeface="Wingdings" panose="05000000000000000000" pitchFamily="2" charset="2"/>
-              <a:buChar char="Ø"/>
+            <a:r>
+              <a:rPr lang="en-US" dirty="0">
+                <a:latin typeface="Calibri" panose="020F0502020204030204" pitchFamily="34" charset="0"/>
+                <a:cs typeface="Calibri" panose="020F0502020204030204" pitchFamily="34" charset="0"/>
+              </a:rPr>
+              <a:t>Dropped the features which have very low fill rate</a:t>
+            </a:r>
+          </a:p>
+          <a:p>
+            <a:r>
+              <a:rPr lang="en-US" dirty="0">
+                <a:latin typeface="Calibri" panose="020F0502020204030204" pitchFamily="34" charset="0"/>
+                <a:cs typeface="Calibri" panose="020F0502020204030204" pitchFamily="34" charset="0"/>
+              </a:rPr>
+              <a:t>Dropped the user behavior features which are not available before issuing the loan.</a:t>
+            </a:r>
+          </a:p>
+          <a:p>
+            <a:r>
+              <a:rPr lang="en-US" dirty="0">
+                <a:latin typeface="Calibri" panose="020F0502020204030204" pitchFamily="34" charset="0"/>
+                <a:cs typeface="Calibri" panose="020F0502020204030204" pitchFamily="34" charset="0"/>
+              </a:rPr>
+              <a:t>Converted the data types of the features as per relevance</a:t>
+            </a:r>
+          </a:p>
+          <a:p>
+            <a:pPr lvl="1">
+              <a:buFontTx/>
+              <a:buChar char="-"/>
             </a:pPr>
             <a:r>
-              <a:rPr lang="en-US" sz="2000" dirty="0">
-                <a:solidFill>
-                  <a:schemeClr val="tx1">
-                    <a:lumMod val="75000"/>
-                    <a:lumOff val="25000"/>
-                  </a:schemeClr>
-                </a:solidFill>
-                <a:latin typeface="-apple-system"/>
+              <a:rPr lang="en-US" dirty="0">
+                <a:latin typeface="Calibri" panose="020F0502020204030204" pitchFamily="34" charset="0"/>
+                <a:cs typeface="Calibri" panose="020F0502020204030204" pitchFamily="34" charset="0"/>
               </a:rPr>
-              <a:t>Calculating the difference amount of </a:t>
-            </a:r>
-            <a:r>
-              <a:rPr lang="en-US" sz="2000" dirty="0" err="1">
-                <a:solidFill>
-                  <a:schemeClr val="tx1">
-                    <a:lumMod val="75000"/>
-                    <a:lumOff val="25000"/>
-                  </a:schemeClr>
-                </a:solidFill>
-                <a:latin typeface="-apple-system"/>
+              <a:t>interest rate, loan term to float from object</a:t>
+            </a:r>
+          </a:p>
+          <a:p>
+            <a:pPr lvl="1">
+              <a:buFontTx/>
+              <a:buChar char="-"/>
+            </a:pPr>
+            <a:r>
+              <a:rPr lang="en-US" dirty="0">
+                <a:latin typeface="Calibri" panose="020F0502020204030204" pitchFamily="34" charset="0"/>
+                <a:cs typeface="Calibri" panose="020F0502020204030204" pitchFamily="34" charset="0"/>
               </a:rPr>
-              <a:t>funded_amnt</a:t>
-            </a:r>
-            <a:r>
-              <a:rPr lang="en-US" sz="2000" dirty="0">
-                <a:solidFill>
-                  <a:schemeClr val="tx1">
-                    <a:lumMod val="75000"/>
-                    <a:lumOff val="25000"/>
-                  </a:schemeClr>
-                </a:solidFill>
-                <a:latin typeface="-apple-system"/>
+              <a:t>Date fields to date from object</a:t>
+            </a:r>
+          </a:p>
+          <a:p>
+            <a:pPr lvl="1">
+              <a:buFontTx/>
+              <a:buChar char="-"/>
+            </a:pPr>
+            <a:r>
+              <a:rPr lang="en-US" dirty="0">
+                <a:latin typeface="Calibri" panose="020F0502020204030204" pitchFamily="34" charset="0"/>
+                <a:cs typeface="Calibri" panose="020F0502020204030204" pitchFamily="34" charset="0"/>
               </a:rPr>
-              <a:t> and </a:t>
-            </a:r>
-            <a:r>
-              <a:rPr lang="en-US" sz="2000" dirty="0" err="1">
-                <a:solidFill>
-                  <a:schemeClr val="tx1">
-                    <a:lumMod val="75000"/>
-                    <a:lumOff val="25000"/>
-                  </a:schemeClr>
-                </a:solidFill>
-                <a:latin typeface="-apple-system"/>
+              <a:t>Created new columns with interest bins and </a:t>
+            </a:r>
+            <a:r>
+              <a:rPr lang="en-US" dirty="0" err="1">
+                <a:latin typeface="Calibri" panose="020F0502020204030204" pitchFamily="34" charset="0"/>
+                <a:cs typeface="Calibri" panose="020F0502020204030204" pitchFamily="34" charset="0"/>
               </a:rPr>
               <a:t>funded_amnt_inv</a:t>
             </a:r>
             <a:r>
-              <a:rPr lang="en-US" sz="2000" dirty="0">
-                <a:solidFill>
-                  <a:schemeClr val="tx1">
-                    <a:lumMod val="75000"/>
-                    <a:lumOff val="25000"/>
-                  </a:schemeClr>
-                </a:solidFill>
-                <a:latin typeface="-apple-system"/>
+              <a:rPr lang="en-US" dirty="0">
+                <a:latin typeface="Calibri" panose="020F0502020204030204" pitchFamily="34" charset="0"/>
+                <a:cs typeface="Calibri" panose="020F0502020204030204" pitchFamily="34" charset="0"/>
               </a:rPr>
-              <a:t>. Issuing more/less loan amount than approved amount doesn't have any effect on charged off.</a:t>
-            </a:r>
-          </a:p>
-          <a:p>
-            <a:pPr marL="91440" indent="-91440" defTabSz="914400">
-              <a:lnSpc>
-                <a:spcPct val="90000"/>
-              </a:lnSpc>
-              <a:spcBef>
-                <a:spcPts val="1200"/>
-              </a:spcBef>
-              <a:spcAft>
-                <a:spcPts val="200"/>
-              </a:spcAft>
-              <a:buClr>
-                <a:schemeClr val="accent1"/>
-              </a:buClr>
-              <a:buSzPct val="100000"/>
-              <a:buFont typeface="Wingdings" panose="05000000000000000000" pitchFamily="2" charset="2"/>
-              <a:buChar char="Ø"/>
-            </a:pPr>
-            <a:r>
-              <a:rPr lang="en-US" sz="2000" dirty="0">
-                <a:solidFill>
-                  <a:schemeClr val="tx1">
-                    <a:lumMod val="75000"/>
-                    <a:lumOff val="25000"/>
-                  </a:schemeClr>
-                </a:solidFill>
-                <a:latin typeface="-apple-system"/>
+              <a:t> bins, and DTI bins.</a:t>
+            </a:r>
+          </a:p>
+          <a:p>
+            <a:r>
+              <a:rPr lang="en-US" dirty="0">
+                <a:latin typeface="Calibri" panose="020F0502020204030204" pitchFamily="34" charset="0"/>
+                <a:cs typeface="Calibri" panose="020F0502020204030204" pitchFamily="34" charset="0"/>
               </a:rPr>
-              <a:t>Calculated the percentage of installment in monthly income. If the Installment to Monthly income percentage is more than ~8%, the chances of charge off increases</a:t>
-            </a:r>
-          </a:p>
-          <a:p>
-            <a:pPr marL="285750" indent="-285750" algn="l">
-              <a:buFont typeface="Wingdings" panose="05000000000000000000" pitchFamily="2" charset="2"/>
-              <a:buChar char="Ø"/>
-            </a:pPr>
-            <a:endParaRPr lang="en-US" b="0" i="0" dirty="0">
-              <a:solidFill>
-                <a:srgbClr val="000000"/>
-              </a:solidFill>
-              <a:effectLst/>
-              <a:latin typeface="Helvetica Neue"/>
-            </a:endParaRPr>
-          </a:p>
-        </p:txBody>
-      </p:sp>
-      <p:pic>
-        <p:nvPicPr>
-          <p:cNvPr id="5" name="Picture 4">
-            <a:extLst>
-              <a:ext uri="{FF2B5EF4-FFF2-40B4-BE49-F238E27FC236}">
-                <a16:creationId xmlns:a16="http://schemas.microsoft.com/office/drawing/2014/main" id="{4D41D004-CA15-B03A-0264-C4910C4119A6}"/>
-              </a:ext>
-            </a:extLst>
-          </p:cNvPr>
-          <p:cNvPicPr>
-            <a:picLocks noChangeAspect="1"/>
-          </p:cNvPicPr>
-          <p:nvPr/>
-        </p:nvPicPr>
-        <p:blipFill>
-          <a:blip r:embed="rId5"/>
-          <a:stretch>
-            <a:fillRect/>
-          </a:stretch>
-        </p:blipFill>
-        <p:spPr>
-          <a:xfrm>
-            <a:off x="3888411" y="3306128"/>
-            <a:ext cx="3531063" cy="2904777"/>
-          </a:xfrm>
-          <a:prstGeom prst="rect">
-            <a:avLst/>
-          </a:prstGeom>
-        </p:spPr>
-      </p:pic>
+              <a:t>Missing value imputations</a:t>
+            </a:r>
+          </a:p>
+        </p:txBody>
+      </p:sp>
     </p:spTree>
     <p:extLst>
       <p:ext uri="{BB962C8B-B14F-4D97-AF65-F5344CB8AC3E}">
-        <p14:creationId xmlns:p14="http://schemas.microsoft.com/office/powerpoint/2010/main" val="1056192473"/>
+        <p14:creationId xmlns:p14="http://schemas.microsoft.com/office/powerpoint/2010/main" val="3851372794"/>
       </p:ext>
     </p:extLst>
   </p:cSld>
@@ -5009,7 +5076,7 @@
 </p:sld>
 </file>
 
-<file path=ppt/slides/slide13.xml><?xml version="1.0" encoding="utf-8"?>
+<file path=ppt/slides/slide4.xml><?xml version="1.0" encoding="utf-8"?>
 <p:sld xmlns:a="http://schemas.openxmlformats.org/drawingml/2006/main" xmlns:r="http://schemas.openxmlformats.org/officeDocument/2006/relationships" xmlns:p="http://schemas.openxmlformats.org/presentationml/2006/main">
   <p:cSld>
     <p:spTree>
@@ -5123,7 +5190,7 @@
           <a:p>
             <a:r>
               <a:rPr lang="en-US" dirty="0"/>
-              <a:t>Conclusion</a:t>
+              <a:t>Univariate Analysis</a:t>
             </a:r>
           </a:p>
         </p:txBody>
@@ -5146,23 +5213,44 @@
         </p:nvSpPr>
         <p:spPr>
           <a:xfrm>
-            <a:off x="1141413" y="1296140"/>
-            <a:ext cx="9905998" cy="4495061"/>
-          </a:xfrm>
-        </p:spPr>
-        <p:txBody>
-          <a:bodyPr/>
+            <a:off x="1261153" y="1296138"/>
+            <a:ext cx="9905998" cy="2882404"/>
+          </a:xfrm>
+          <a:ln>
+            <a:solidFill>
+              <a:schemeClr val="bg1"/>
+            </a:solidFill>
+          </a:ln>
+        </p:spPr>
+        <p:txBody>
+          <a:bodyPr>
+            <a:normAutofit/>
+          </a:bodyPr>
           <a:lstStyle/>
           <a:p>
             <a:pPr marL="0" indent="0">
+              <a:buFont typeface="Arial"/>
               <a:buNone/>
+            </a:pPr>
+            <a:r>
+              <a:rPr lang="en-US" b="1" u="sng" dirty="0">
+                <a:latin typeface="Calibri" panose="020F0502020204030204" pitchFamily="34" charset="0"/>
+                <a:cs typeface="Calibri" panose="020F0502020204030204" pitchFamily="34" charset="0"/>
+              </a:rPr>
+              <a:t>Continuous variables</a:t>
+            </a:r>
+          </a:p>
+          <a:p>
+            <a:pPr>
+              <a:buFont typeface="Wingdings" panose="05000000000000000000" pitchFamily="2" charset="2"/>
+              <a:buChar char="Ø"/>
             </a:pPr>
             <a:r>
               <a:rPr lang="en-US" dirty="0">
                 <a:latin typeface="Calibri" panose="020F0502020204030204" pitchFamily="34" charset="0"/>
                 <a:cs typeface="Calibri" panose="020F0502020204030204" pitchFamily="34" charset="0"/>
               </a:rPr>
-              <a:t>Lending club can consider below factors to decrease the Charge off percentage.</a:t>
+              <a:t>Highest distribution of Issued amount lies is between 5000 to 15000.</a:t>
             </a:r>
           </a:p>
           <a:p>
@@ -5175,7 +5263,7 @@
                 <a:latin typeface="Calibri" panose="020F0502020204030204" pitchFamily="34" charset="0"/>
                 <a:cs typeface="Calibri" panose="020F0502020204030204" pitchFamily="34" charset="0"/>
               </a:rPr>
-              <a:t>Interest rate for 60 months loan term can be reduced.</a:t>
+              <a:t>Highest distribution of Installment amount lies between 200 to 500.</a:t>
             </a:r>
           </a:p>
           <a:p>
@@ -5184,15 +5272,11 @@
               <a:buChar char="Ø"/>
             </a:pPr>
             <a:r>
-              <a:rPr lang="en-US" dirty="0"/>
-              <a:t>Should not give more loans if Revolving line utilization rate</a:t>
-            </a:r>
-            <a:r>
               <a:rPr lang="en-US" dirty="0">
                 <a:latin typeface="Calibri" panose="020F0502020204030204" pitchFamily="34" charset="0"/>
                 <a:cs typeface="Calibri" panose="020F0502020204030204" pitchFamily="34" charset="0"/>
               </a:rPr>
-              <a:t> is higher.</a:t>
+              <a:t>Highest distribution of interest rate lies between 10 to 15.</a:t>
             </a:r>
           </a:p>
           <a:p>
@@ -5205,7 +5289,7 @@
                 <a:latin typeface="Calibri" panose="020F0502020204030204" pitchFamily="34" charset="0"/>
                 <a:cs typeface="Calibri" panose="020F0502020204030204" pitchFamily="34" charset="0"/>
               </a:rPr>
-              <a:t>Should issue loans carefully for certain grades which has higher charge off percentage.</a:t>
+              <a:t>Highest distribution of DTI lies between 8 to 18.</a:t>
             </a:r>
           </a:p>
           <a:p>
@@ -5214,62 +5298,122 @@
               <a:buChar char="Ø"/>
             </a:pPr>
             <a:r>
-              <a:rPr lang="en-US" dirty="0">
-                <a:latin typeface="Calibri" panose="020F0502020204030204" pitchFamily="34" charset="0"/>
-                <a:cs typeface="Calibri" panose="020F0502020204030204" pitchFamily="34" charset="0"/>
+              <a:rPr lang="en-US" b="0" i="0" dirty="0">
+                <a:effectLst/>
+                <a:latin typeface="-apple-system"/>
               </a:rPr>
-              <a:t>Should not give more loans to people from NE state as they have ~60% charge off’s.</a:t>
-            </a:r>
-          </a:p>
-          <a:p>
-            <a:pPr>
-              <a:buFont typeface="Wingdings" panose="05000000000000000000" pitchFamily="2" charset="2"/>
-              <a:buChar char="Ø"/>
-            </a:pPr>
-            <a:r>
-              <a:rPr lang="en-US" dirty="0">
-                <a:latin typeface="Calibri" panose="020F0502020204030204" pitchFamily="34" charset="0"/>
-                <a:cs typeface="Calibri" panose="020F0502020204030204" pitchFamily="34" charset="0"/>
-              </a:rPr>
-              <a:t>Should also reduce the number of loan for CA State as it has more number of charge off’s.</a:t>
-            </a:r>
-          </a:p>
-          <a:p>
-            <a:pPr>
-              <a:buFont typeface="Wingdings" panose="05000000000000000000" pitchFamily="2" charset="2"/>
-              <a:buChar char="Ø"/>
+              <a:t>A lot of features are quite skewed including annual income.</a:t>
+            </a:r>
+            <a:endParaRPr lang="en-US" dirty="0">
+              <a:latin typeface="Calibri" panose="020F0502020204030204" pitchFamily="34" charset="0"/>
+              <a:cs typeface="Calibri" panose="020F0502020204030204" pitchFamily="34" charset="0"/>
+            </a:endParaRPr>
+          </a:p>
+          <a:p>
+            <a:pPr marL="0" indent="0">
+              <a:buNone/>
             </a:pPr>
             <a:endParaRPr lang="en-US" dirty="0">
               <a:latin typeface="Calibri" panose="020F0502020204030204" pitchFamily="34" charset="0"/>
               <a:cs typeface="Calibri" panose="020F0502020204030204" pitchFamily="34" charset="0"/>
             </a:endParaRPr>
           </a:p>
-          <a:p>
-            <a:pPr>
-              <a:buFont typeface="Wingdings" panose="05000000000000000000" pitchFamily="2" charset="2"/>
-              <a:buChar char="Ø"/>
-            </a:pPr>
-            <a:endParaRPr lang="en-US" dirty="0">
-              <a:latin typeface="Calibri" panose="020F0502020204030204" pitchFamily="34" charset="0"/>
-              <a:cs typeface="Calibri" panose="020F0502020204030204" pitchFamily="34" charset="0"/>
-            </a:endParaRPr>
-          </a:p>
-          <a:p>
-            <a:pPr>
-              <a:buFont typeface="Wingdings" panose="05000000000000000000" pitchFamily="2" charset="2"/>
-              <a:buChar char="Ø"/>
-            </a:pPr>
-            <a:endParaRPr lang="en-US" dirty="0">
-              <a:latin typeface="Calibri" panose="020F0502020204030204" pitchFamily="34" charset="0"/>
-              <a:cs typeface="Calibri" panose="020F0502020204030204" pitchFamily="34" charset="0"/>
-            </a:endParaRPr>
-          </a:p>
-        </p:txBody>
-      </p:sp>
+        </p:txBody>
+      </p:sp>
+      <p:pic>
+        <p:nvPicPr>
+          <p:cNvPr id="6" name="Picture 5">
+            <a:extLst>
+              <a:ext uri="{FF2B5EF4-FFF2-40B4-BE49-F238E27FC236}">
+                <a16:creationId xmlns:a16="http://schemas.microsoft.com/office/drawing/2014/main" id="{8DFB137F-0189-62C2-9786-70672DB6BC84}"/>
+              </a:ext>
+            </a:extLst>
+          </p:cNvPr>
+          <p:cNvPicPr>
+            <a:picLocks noChangeAspect="1"/>
+          </p:cNvPicPr>
+          <p:nvPr/>
+        </p:nvPicPr>
+        <p:blipFill>
+          <a:blip r:embed="rId5"/>
+          <a:stretch>
+            <a:fillRect/>
+          </a:stretch>
+        </p:blipFill>
+        <p:spPr>
+          <a:xfrm>
+            <a:off x="1261153" y="3906254"/>
+            <a:ext cx="3274511" cy="2342146"/>
+          </a:xfrm>
+          <a:prstGeom prst="rect">
+            <a:avLst/>
+          </a:prstGeom>
+        </p:spPr>
+      </p:pic>
+      <p:pic>
+        <p:nvPicPr>
+          <p:cNvPr id="9" name="Picture 8">
+            <a:extLst>
+              <a:ext uri="{FF2B5EF4-FFF2-40B4-BE49-F238E27FC236}">
+                <a16:creationId xmlns:a16="http://schemas.microsoft.com/office/drawing/2014/main" id="{9D4FD6EA-1207-C7A9-BF7D-782992C85599}"/>
+              </a:ext>
+            </a:extLst>
+          </p:cNvPr>
+          <p:cNvPicPr>
+            <a:picLocks noChangeAspect="1"/>
+          </p:cNvPicPr>
+          <p:nvPr/>
+        </p:nvPicPr>
+        <p:blipFill>
+          <a:blip r:embed="rId6"/>
+          <a:stretch>
+            <a:fillRect/>
+          </a:stretch>
+        </p:blipFill>
+        <p:spPr>
+          <a:xfrm>
+            <a:off x="4397741" y="3906254"/>
+            <a:ext cx="3437395" cy="2342146"/>
+          </a:xfrm>
+          <a:prstGeom prst="rect">
+            <a:avLst/>
+          </a:prstGeom>
+        </p:spPr>
+      </p:pic>
+      <p:pic>
+        <p:nvPicPr>
+          <p:cNvPr id="11" name="Picture 10">
+            <a:extLst>
+              <a:ext uri="{FF2B5EF4-FFF2-40B4-BE49-F238E27FC236}">
+                <a16:creationId xmlns:a16="http://schemas.microsoft.com/office/drawing/2014/main" id="{3D523AE0-C580-41E9-09A1-2E0B26FAAAC5}"/>
+              </a:ext>
+            </a:extLst>
+          </p:cNvPr>
+          <p:cNvPicPr>
+            <a:picLocks noChangeAspect="1"/>
+          </p:cNvPicPr>
+          <p:nvPr/>
+        </p:nvPicPr>
+        <p:blipFill>
+          <a:blip r:embed="rId7"/>
+          <a:stretch>
+            <a:fillRect/>
+          </a:stretch>
+        </p:blipFill>
+        <p:spPr>
+          <a:xfrm>
+            <a:off x="7692955" y="3906254"/>
+            <a:ext cx="3357459" cy="2342145"/>
+          </a:xfrm>
+          <a:prstGeom prst="rect">
+            <a:avLst/>
+          </a:prstGeom>
+        </p:spPr>
+      </p:pic>
     </p:spTree>
     <p:extLst>
       <p:ext uri="{BB962C8B-B14F-4D97-AF65-F5344CB8AC3E}">
-        <p14:creationId xmlns:p14="http://schemas.microsoft.com/office/powerpoint/2010/main" val="2392271692"/>
+        <p14:creationId xmlns:p14="http://schemas.microsoft.com/office/powerpoint/2010/main" val="1314119323"/>
       </p:ext>
     </p:extLst>
   </p:cSld>
@@ -5279,7 +5423,7 @@
 </p:sld>
 </file>
 
-<file path=ppt/slides/slide2.xml><?xml version="1.0" encoding="utf-8"?>
+<file path=ppt/slides/slide5.xml><?xml version="1.0" encoding="utf-8"?>
 <p:sld xmlns:a="http://schemas.openxmlformats.org/drawingml/2006/main" xmlns:r="http://schemas.openxmlformats.org/officeDocument/2006/relationships" xmlns:p="http://schemas.openxmlformats.org/presentationml/2006/main">
   <p:cSld>
     <p:spTree>
@@ -5312,223 +5456,6 @@
             <p:custDataLst>
               <p:tags r:id="rId1"/>
             </p:custDataLst>
-            <p:extLst>
-              <p:ext uri="{D42A27DB-BD31-4B8C-83A1-F6EECF244321}">
-                <p14:modId xmlns:p14="http://schemas.microsoft.com/office/powerpoint/2010/main" val="1951031672"/>
-              </p:ext>
-            </p:extLst>
-          </p:nvPr>
-        </p:nvGraphicFramePr>
-        <p:xfrm>
-          <a:off x="1588" y="1588"/>
-          <a:ext cx="1588" cy="1588"/>
-        </p:xfrm>
-        <a:graphic>
-          <a:graphicData uri="http://schemas.openxmlformats.org/presentationml/2006/ole">
-            <mc:AlternateContent xmlns:mc="http://schemas.openxmlformats.org/markup-compatibility/2006">
-              <mc:Choice xmlns:v="urn:schemas-microsoft-com:vml" Requires="v">
-                <p:oleObj name="think-cell Slide" r:id="rId3" imgW="473" imgH="473" progId="TCLayout.ActiveDocument.1">
-                  <p:embed/>
-                </p:oleObj>
-              </mc:Choice>
-              <mc:Fallback>
-                <p:oleObj name="think-cell Slide" r:id="rId3" imgW="473" imgH="473" progId="TCLayout.ActiveDocument.1">
-                  <p:embed/>
-                  <p:pic>
-                    <p:nvPicPr>
-                      <p:cNvPr id="0" name=""/>
-                      <p:cNvPicPr/>
-                      <p:nvPr/>
-                    </p:nvPicPr>
-                    <p:blipFill>
-                      <a:blip r:embed="rId4"/>
-                      <a:stretch>
-                        <a:fillRect/>
-                      </a:stretch>
-                    </p:blipFill>
-                    <p:spPr>
-                      <a:xfrm>
-                        <a:off x="1588" y="1588"/>
-                        <a:ext cx="1588" cy="1588"/>
-                      </a:xfrm>
-                      <a:prstGeom prst="rect">
-                        <a:avLst/>
-                      </a:prstGeom>
-                    </p:spPr>
-                  </p:pic>
-                </p:oleObj>
-              </mc:Fallback>
-            </mc:AlternateContent>
-          </a:graphicData>
-        </a:graphic>
-      </p:graphicFrame>
-      <p:sp>
-        <p:nvSpPr>
-          <p:cNvPr id="2" name="Title 1">
-            <a:extLst>
-              <a:ext uri="{FF2B5EF4-FFF2-40B4-BE49-F238E27FC236}">
-                <a16:creationId xmlns:a16="http://schemas.microsoft.com/office/drawing/2014/main" id="{109596E1-A18E-4397-8DCE-778F5C1FB128}"/>
-              </a:ext>
-            </a:extLst>
-          </p:cNvPr>
-          <p:cNvSpPr>
-            <a:spLocks noGrp="1"/>
-          </p:cNvSpPr>
-          <p:nvPr>
-            <p:ph type="title"/>
-          </p:nvPr>
-        </p:nvSpPr>
-        <p:spPr>
-          <a:xfrm>
-            <a:off x="1141413" y="364218"/>
-            <a:ext cx="9905998" cy="686540"/>
-          </a:xfrm>
-        </p:spPr>
-        <p:txBody>
-          <a:bodyPr vert="horz">
-            <a:normAutofit fontScale="90000"/>
-          </a:bodyPr>
-          <a:lstStyle/>
-          <a:p>
-            <a:r>
-              <a:rPr lang="en-US" dirty="0"/>
-              <a:t>Case Study Summary</a:t>
-            </a:r>
-          </a:p>
-        </p:txBody>
-      </p:sp>
-      <p:sp>
-        <p:nvSpPr>
-          <p:cNvPr id="3" name="Content Placeholder 2">
-            <a:extLst>
-              <a:ext uri="{FF2B5EF4-FFF2-40B4-BE49-F238E27FC236}">
-                <a16:creationId xmlns:a16="http://schemas.microsoft.com/office/drawing/2014/main" id="{31A57B99-F244-461F-A4E9-BA616D17E424}"/>
-              </a:ext>
-            </a:extLst>
-          </p:cNvPr>
-          <p:cNvSpPr>
-            <a:spLocks noGrp="1"/>
-          </p:cNvSpPr>
-          <p:nvPr>
-            <p:ph idx="1"/>
-          </p:nvPr>
-        </p:nvSpPr>
-        <p:spPr>
-          <a:xfrm>
-            <a:off x="1141413" y="1296140"/>
-            <a:ext cx="9905998" cy="4495061"/>
-          </a:xfrm>
-        </p:spPr>
-        <p:txBody>
-          <a:bodyPr/>
-          <a:lstStyle/>
-          <a:p>
-            <a:r>
-              <a:rPr lang="en-US" dirty="0">
-                <a:latin typeface="Calibri" panose="020F0502020204030204" pitchFamily="34" charset="0"/>
-                <a:cs typeface="Calibri" panose="020F0502020204030204" pitchFamily="34" charset="0"/>
-              </a:rPr>
-              <a:t>Built understanding of the objective, different features and  their data types</a:t>
-            </a:r>
-          </a:p>
-          <a:p>
-            <a:r>
-              <a:rPr lang="en-US" dirty="0">
-                <a:latin typeface="Calibri" panose="020F0502020204030204" pitchFamily="34" charset="0"/>
-                <a:cs typeface="Calibri" panose="020F0502020204030204" pitchFamily="34" charset="0"/>
-              </a:rPr>
-              <a:t>addressed the data quality issues including missing values, outliers and redundant features </a:t>
-            </a:r>
-          </a:p>
-          <a:p>
-            <a:r>
-              <a:rPr lang="en-US" dirty="0">
-                <a:latin typeface="Calibri" panose="020F0502020204030204" pitchFamily="34" charset="0"/>
-                <a:cs typeface="Calibri" panose="020F0502020204030204" pitchFamily="34" charset="0"/>
-              </a:rPr>
-              <a:t>Univariate analysis of categorial and continuous variables and their relationship with loan status</a:t>
-            </a:r>
-          </a:p>
-          <a:p>
-            <a:r>
-              <a:rPr lang="en-US" dirty="0">
-                <a:latin typeface="Calibri" panose="020F0502020204030204" pitchFamily="34" charset="0"/>
-                <a:cs typeface="Calibri" panose="020F0502020204030204" pitchFamily="34" charset="0"/>
-              </a:rPr>
-              <a:t>Derived new features from the data as per the domain understanding </a:t>
-            </a:r>
-          </a:p>
-          <a:p>
-            <a:r>
-              <a:rPr lang="en-US" dirty="0">
-                <a:latin typeface="Calibri" panose="020F0502020204030204" pitchFamily="34" charset="0"/>
-                <a:cs typeface="Calibri" panose="020F0502020204030204" pitchFamily="34" charset="0"/>
-              </a:rPr>
-              <a:t>Bivariate analysis and segmented analysis to understand the relationship between different features</a:t>
-            </a:r>
-          </a:p>
-          <a:p>
-            <a:r>
-              <a:rPr lang="en-US" dirty="0">
-                <a:latin typeface="Calibri" panose="020F0502020204030204" pitchFamily="34" charset="0"/>
-                <a:cs typeface="Calibri" panose="020F0502020204030204" pitchFamily="34" charset="0"/>
-              </a:rPr>
-              <a:t>Identified significant metrics in identifying default</a:t>
-            </a:r>
-          </a:p>
-        </p:txBody>
-      </p:sp>
-    </p:spTree>
-    <p:extLst>
-      <p:ext uri="{BB962C8B-B14F-4D97-AF65-F5344CB8AC3E}">
-        <p14:creationId xmlns:p14="http://schemas.microsoft.com/office/powerpoint/2010/main" val="3963955110"/>
-      </p:ext>
-    </p:extLst>
-  </p:cSld>
-  <p:clrMapOvr>
-    <a:masterClrMapping/>
-  </p:clrMapOvr>
-</p:sld>
-</file>
-
-<file path=ppt/slides/slide3.xml><?xml version="1.0" encoding="utf-8"?>
-<p:sld xmlns:a="http://schemas.openxmlformats.org/drawingml/2006/main" xmlns:r="http://schemas.openxmlformats.org/officeDocument/2006/relationships" xmlns:p="http://schemas.openxmlformats.org/presentationml/2006/main">
-  <p:cSld>
-    <p:spTree>
-      <p:nvGrpSpPr>
-        <p:cNvPr id="1" name=""/>
-        <p:cNvGrpSpPr/>
-        <p:nvPr/>
-      </p:nvGrpSpPr>
-      <p:grpSpPr>
-        <a:xfrm>
-          <a:off x="0" y="0"/>
-          <a:ext cx="0" cy="0"/>
-          <a:chOff x="0" y="0"/>
-          <a:chExt cx="0" cy="0"/>
-        </a:xfrm>
-      </p:grpSpPr>
-      <p:graphicFrame>
-        <p:nvGraphicFramePr>
-          <p:cNvPr id="4" name="Object 3" hidden="1">
-            <a:extLst>
-              <a:ext uri="{FF2B5EF4-FFF2-40B4-BE49-F238E27FC236}">
-                <a16:creationId xmlns:a16="http://schemas.microsoft.com/office/drawing/2014/main" id="{D6C5948B-EBDC-4BC7-B296-690BCA97CA05}"/>
-              </a:ext>
-            </a:extLst>
-          </p:cNvPr>
-          <p:cNvGraphicFramePr>
-            <a:graphicFrameLocks noChangeAspect="1"/>
-          </p:cNvGraphicFramePr>
-          <p:nvPr>
-            <p:custDataLst>
-              <p:tags r:id="rId1"/>
-            </p:custDataLst>
-            <p:extLst>
-              <p:ext uri="{D42A27DB-BD31-4B8C-83A1-F6EECF244321}">
-                <p14:modId xmlns:p14="http://schemas.microsoft.com/office/powerpoint/2010/main" val="1553655526"/>
-              </p:ext>
-            </p:extLst>
           </p:nvPr>
         </p:nvGraphicFramePr>
         <p:xfrm>
@@ -5598,7 +5525,7 @@
         </p:nvSpPr>
         <p:spPr>
           <a:xfrm>
-            <a:off x="1141413" y="336885"/>
+            <a:off x="1141413" y="609600"/>
             <a:ext cx="9905998" cy="686540"/>
           </a:xfrm>
         </p:spPr>
@@ -5610,7 +5537,7 @@
           <a:p>
             <a:r>
               <a:rPr lang="en-US" dirty="0"/>
-              <a:t>Data Cleaning and manipulation</a:t>
+              <a:t>Univariate Analysis</a:t>
             </a:r>
           </a:p>
         </p:txBody>
@@ -5633,122 +5560,180 @@
         </p:nvSpPr>
         <p:spPr>
           <a:xfrm>
-            <a:off x="1141413" y="1296140"/>
-            <a:ext cx="9905998" cy="2794597"/>
-          </a:xfrm>
-        </p:spPr>
-        <p:txBody>
-          <a:bodyPr/>
+            <a:off x="1261153" y="1296139"/>
+            <a:ext cx="9965240" cy="2353439"/>
+          </a:xfrm>
+          <a:ln>
+            <a:solidFill>
+              <a:schemeClr val="bg1"/>
+            </a:solidFill>
+          </a:ln>
+        </p:spPr>
+        <p:txBody>
+          <a:bodyPr>
+            <a:normAutofit/>
+          </a:bodyPr>
           <a:lstStyle/>
           <a:p>
-            <a:r>
-              <a:rPr lang="en-US" dirty="0">
+            <a:pPr marL="0" indent="0">
+              <a:buNone/>
+            </a:pPr>
+            <a:r>
+              <a:rPr lang="en-US" b="1" u="sng" dirty="0">
                 <a:latin typeface="Calibri" panose="020F0502020204030204" pitchFamily="34" charset="0"/>
                 <a:cs typeface="Calibri" panose="020F0502020204030204" pitchFamily="34" charset="0"/>
               </a:rPr>
-              <a:t>Dropped the features which have very low fill rate</a:t>
-            </a:r>
-          </a:p>
-          <a:p>
+              <a:t>Categorical Variables</a:t>
+            </a:r>
+          </a:p>
+          <a:p>
+            <a:pPr>
+              <a:buFont typeface="Wingdings" panose="05000000000000000000" pitchFamily="2" charset="2"/>
+              <a:buChar char="Ø"/>
+            </a:pPr>
+            <a:r>
+              <a:rPr lang="en-US" b="0" i="0" dirty="0">
+                <a:effectLst/>
+                <a:latin typeface="-apple-system"/>
+              </a:rPr>
+              <a:t>There are around 15 percent charged off loans</a:t>
+            </a:r>
+          </a:p>
+          <a:p>
+            <a:pPr>
+              <a:buFont typeface="Wingdings" panose="05000000000000000000" pitchFamily="2" charset="2"/>
+              <a:buChar char="Ø"/>
+            </a:pPr>
             <a:r>
               <a:rPr lang="en-US" dirty="0">
-                <a:latin typeface="Calibri" panose="020F0502020204030204" pitchFamily="34" charset="0"/>
-                <a:cs typeface="Calibri" panose="020F0502020204030204" pitchFamily="34" charset="0"/>
+                <a:effectLst/>
+                <a:latin typeface="-apple-system"/>
               </a:rPr>
-              <a:t>Dropped the user behavior features which are not available before issuing the loan.</a:t>
-            </a:r>
-          </a:p>
-          <a:p>
+              <a:t>76% of loans term is 36 months rest are 60 months.</a:t>
+            </a:r>
+            <a:endParaRPr lang="en-US" b="0" i="0" dirty="0">
+              <a:effectLst/>
+              <a:latin typeface="-apple-system"/>
+            </a:endParaRPr>
+          </a:p>
+          <a:p>
+            <a:pPr>
+              <a:buFont typeface="Wingdings" panose="05000000000000000000" pitchFamily="2" charset="2"/>
+              <a:buChar char="Ø"/>
+            </a:pPr>
             <a:r>
               <a:rPr lang="en-US" dirty="0">
-                <a:latin typeface="Calibri" panose="020F0502020204030204" pitchFamily="34" charset="0"/>
-                <a:cs typeface="Calibri" panose="020F0502020204030204" pitchFamily="34" charset="0"/>
+                <a:effectLst/>
+                <a:latin typeface="-apple-system"/>
               </a:rPr>
-              <a:t>Converted the data types of the features as per relevance</a:t>
-            </a:r>
-          </a:p>
-          <a:p>
-            <a:pPr lvl="1">
-              <a:buFontTx/>
-              <a:buChar char="-"/>
+              <a:t>Most number(~17500) of loans are taken for debt consolidation</a:t>
+            </a:r>
+          </a:p>
+          <a:p>
+            <a:pPr marL="0" indent="0">
+              <a:buNone/>
             </a:pPr>
-            <a:r>
-              <a:rPr lang="en-US" dirty="0">
-                <a:latin typeface="Calibri" panose="020F0502020204030204" pitchFamily="34" charset="0"/>
-                <a:cs typeface="Calibri" panose="020F0502020204030204" pitchFamily="34" charset="0"/>
-              </a:rPr>
-              <a:t>interest rate, loan term and </a:t>
-            </a:r>
-            <a:r>
-              <a:rPr lang="en-US" dirty="0" err="1">
-                <a:latin typeface="Calibri" panose="020F0502020204030204" pitchFamily="34" charset="0"/>
-                <a:cs typeface="Calibri" panose="020F0502020204030204" pitchFamily="34" charset="0"/>
-              </a:rPr>
-              <a:t>revol</a:t>
-            </a:r>
-            <a:r>
-              <a:rPr lang="en-US" dirty="0">
-                <a:latin typeface="Calibri" panose="020F0502020204030204" pitchFamily="34" charset="0"/>
-                <a:cs typeface="Calibri" panose="020F0502020204030204" pitchFamily="34" charset="0"/>
-              </a:rPr>
-              <a:t> util to float from object</a:t>
-            </a:r>
-          </a:p>
-          <a:p>
-            <a:pPr lvl="1">
-              <a:buFontTx/>
-              <a:buChar char="-"/>
-            </a:pPr>
-            <a:r>
-              <a:rPr lang="en-US" dirty="0">
-                <a:latin typeface="Calibri" panose="020F0502020204030204" pitchFamily="34" charset="0"/>
-                <a:cs typeface="Calibri" panose="020F0502020204030204" pitchFamily="34" charset="0"/>
-              </a:rPr>
-              <a:t>Date fields to date from object</a:t>
-            </a:r>
-          </a:p>
-          <a:p>
-            <a:pPr lvl="1">
-              <a:buFontTx/>
-              <a:buChar char="-"/>
-            </a:pPr>
-            <a:r>
-              <a:rPr lang="en-US" dirty="0">
-                <a:latin typeface="Calibri" panose="020F0502020204030204" pitchFamily="34" charset="0"/>
-                <a:cs typeface="Calibri" panose="020F0502020204030204" pitchFamily="34" charset="0"/>
-              </a:rPr>
-              <a:t>Created new columns with interest bins and </a:t>
-            </a:r>
-            <a:r>
-              <a:rPr lang="en-US" dirty="0" err="1">
-                <a:latin typeface="Calibri" panose="020F0502020204030204" pitchFamily="34" charset="0"/>
-                <a:cs typeface="Calibri" panose="020F0502020204030204" pitchFamily="34" charset="0"/>
-              </a:rPr>
-              <a:t>funded_amnt_inv</a:t>
-            </a:r>
-            <a:r>
-              <a:rPr lang="en-US" dirty="0">
-                <a:latin typeface="Calibri" panose="020F0502020204030204" pitchFamily="34" charset="0"/>
-                <a:cs typeface="Calibri" panose="020F0502020204030204" pitchFamily="34" charset="0"/>
-              </a:rPr>
-              <a:t> bins, and DTI bins.</a:t>
-            </a:r>
-          </a:p>
-          <a:p>
-            <a:r>
-              <a:rPr lang="en-US" dirty="0">
-                <a:latin typeface="Calibri" panose="020F0502020204030204" pitchFamily="34" charset="0"/>
-                <a:cs typeface="Calibri" panose="020F0502020204030204" pitchFamily="34" charset="0"/>
-              </a:rPr>
-              <a:t>Missing value imputations</a:t>
-            </a:r>
-          </a:p>
-        </p:txBody>
-      </p:sp>
+            <a:endParaRPr lang="en-US" dirty="0">
+              <a:latin typeface="Calibri" panose="020F0502020204030204" pitchFamily="34" charset="0"/>
+              <a:cs typeface="Calibri" panose="020F0502020204030204" pitchFamily="34" charset="0"/>
+            </a:endParaRPr>
+          </a:p>
+        </p:txBody>
+      </p:sp>
+      <p:pic>
+        <p:nvPicPr>
+          <p:cNvPr id="7" name="Picture 6">
+            <a:extLst>
+              <a:ext uri="{FF2B5EF4-FFF2-40B4-BE49-F238E27FC236}">
+                <a16:creationId xmlns:a16="http://schemas.microsoft.com/office/drawing/2014/main" id="{336BDE09-9185-246A-9466-1955266F70DA}"/>
+              </a:ext>
+            </a:extLst>
+          </p:cNvPr>
+          <p:cNvPicPr>
+            <a:picLocks noChangeAspect="1"/>
+          </p:cNvPicPr>
+          <p:nvPr/>
+        </p:nvPicPr>
+        <p:blipFill>
+          <a:blip r:embed="rId5"/>
+          <a:stretch>
+            <a:fillRect/>
+          </a:stretch>
+        </p:blipFill>
+        <p:spPr>
+          <a:xfrm>
+            <a:off x="1261153" y="3208422"/>
+            <a:ext cx="3367894" cy="3039978"/>
+          </a:xfrm>
+          <a:prstGeom prst="rect">
+            <a:avLst/>
+          </a:prstGeom>
+        </p:spPr>
+      </p:pic>
+      <p:pic>
+        <p:nvPicPr>
+          <p:cNvPr id="10" name="Picture 9">
+            <a:extLst>
+              <a:ext uri="{FF2B5EF4-FFF2-40B4-BE49-F238E27FC236}">
+                <a16:creationId xmlns:a16="http://schemas.microsoft.com/office/drawing/2014/main" id="{135F3CF8-F45F-EE06-3450-F7E575DFCC5D}"/>
+              </a:ext>
+            </a:extLst>
+          </p:cNvPr>
+          <p:cNvPicPr>
+            <a:picLocks noChangeAspect="1"/>
+          </p:cNvPicPr>
+          <p:nvPr/>
+        </p:nvPicPr>
+        <p:blipFill>
+          <a:blip r:embed="rId6"/>
+          <a:stretch>
+            <a:fillRect/>
+          </a:stretch>
+        </p:blipFill>
+        <p:spPr>
+          <a:xfrm>
+            <a:off x="4343885" y="3208422"/>
+            <a:ext cx="3583835" cy="2819398"/>
+          </a:xfrm>
+          <a:prstGeom prst="rect">
+            <a:avLst/>
+          </a:prstGeom>
+        </p:spPr>
+      </p:pic>
+      <p:pic>
+        <p:nvPicPr>
+          <p:cNvPr id="12" name="Picture 11">
+            <a:extLst>
+              <a:ext uri="{FF2B5EF4-FFF2-40B4-BE49-F238E27FC236}">
+                <a16:creationId xmlns:a16="http://schemas.microsoft.com/office/drawing/2014/main" id="{A218BDC6-3CCB-F3CE-88F9-F3195BF3B40A}"/>
+              </a:ext>
+            </a:extLst>
+          </p:cNvPr>
+          <p:cNvPicPr>
+            <a:picLocks noChangeAspect="1"/>
+          </p:cNvPicPr>
+          <p:nvPr/>
+        </p:nvPicPr>
+        <p:blipFill>
+          <a:blip r:embed="rId7"/>
+          <a:stretch>
+            <a:fillRect/>
+          </a:stretch>
+        </p:blipFill>
+        <p:spPr>
+          <a:xfrm>
+            <a:off x="7927720" y="3318710"/>
+            <a:ext cx="3583838" cy="2819400"/>
+          </a:xfrm>
+          <a:prstGeom prst="rect">
+            <a:avLst/>
+          </a:prstGeom>
+        </p:spPr>
+      </p:pic>
     </p:spTree>
     <p:extLst>
       <p:ext uri="{BB962C8B-B14F-4D97-AF65-F5344CB8AC3E}">
-        <p14:creationId xmlns:p14="http://schemas.microsoft.com/office/powerpoint/2010/main" val="3851372794"/>
+        <p14:creationId xmlns:p14="http://schemas.microsoft.com/office/powerpoint/2010/main" val="3627380008"/>
       </p:ext>
     </p:extLst>
   </p:cSld>
@@ -5758,7 +5743,7 @@
 </p:sld>
 </file>
 
-<file path=ppt/slides/slide4.xml><?xml version="1.0" encoding="utf-8"?>
+<file path=ppt/slides/slide6.xml><?xml version="1.0" encoding="utf-8"?>
 <p:sld xmlns:a="http://schemas.openxmlformats.org/drawingml/2006/main" xmlns:r="http://schemas.openxmlformats.org/officeDocument/2006/relationships" xmlns:p="http://schemas.openxmlformats.org/presentationml/2006/main">
   <p:cSld>
     <p:spTree>
@@ -5791,6 +5776,11 @@
             <p:custDataLst>
               <p:tags r:id="rId1"/>
             </p:custDataLst>
+            <p:extLst>
+              <p:ext uri="{D42A27DB-BD31-4B8C-83A1-F6EECF244321}">
+                <p14:modId xmlns:p14="http://schemas.microsoft.com/office/powerpoint/2010/main" val="1213879465"/>
+              </p:ext>
+            </p:extLst>
           </p:nvPr>
         </p:nvGraphicFramePr>
         <p:xfrm>
@@ -5895,8 +5885,8 @@
         </p:nvSpPr>
         <p:spPr>
           <a:xfrm>
-            <a:off x="1261153" y="1296138"/>
-            <a:ext cx="9905998" cy="2882404"/>
+            <a:off x="1261153" y="1296139"/>
+            <a:ext cx="9965240" cy="2275739"/>
           </a:xfrm>
           <a:ln>
             <a:solidFill>
@@ -5911,7 +5901,6 @@
           <a:lstStyle/>
           <a:p>
             <a:pPr marL="0" indent="0">
-              <a:buFont typeface="Arial"/>
               <a:buNone/>
             </a:pPr>
             <a:r>
@@ -5919,7 +5908,7 @@
                 <a:latin typeface="Calibri" panose="020F0502020204030204" pitchFamily="34" charset="0"/>
                 <a:cs typeface="Calibri" panose="020F0502020204030204" pitchFamily="34" charset="0"/>
               </a:rPr>
-              <a:t>Continuous variables</a:t>
+              <a:t>Categorical Variables</a:t>
             </a:r>
           </a:p>
           <a:p>
@@ -5929,10 +5918,10 @@
             </a:pPr>
             <a:r>
               <a:rPr lang="en-US" dirty="0">
-                <a:latin typeface="Calibri" panose="020F0502020204030204" pitchFamily="34" charset="0"/>
-                <a:cs typeface="Calibri" panose="020F0502020204030204" pitchFamily="34" charset="0"/>
+                <a:effectLst/>
+                <a:latin typeface="-apple-system"/>
               </a:rPr>
-              <a:t>Highest distribution of Issued amount lies is between 5000 to 15000.</a:t>
+              <a:t>States CA, NY, FL, Tx has highest number of loans.</a:t>
             </a:r>
           </a:p>
           <a:p>
@@ -5942,10 +5931,11 @@
             </a:pPr>
             <a:r>
               <a:rPr lang="en-US" dirty="0">
-                <a:latin typeface="Calibri" panose="020F0502020204030204" pitchFamily="34" charset="0"/>
+                <a:effectLst/>
+                <a:latin typeface="-apple-system"/>
                 <a:cs typeface="Calibri" panose="020F0502020204030204" pitchFamily="34" charset="0"/>
               </a:rPr>
-              <a:t>Highest distribution of Installment amount lies between 200 to 500.</a:t>
+              <a:t>Most number of loans are given to Grad A, B, C, D.</a:t>
             </a:r>
           </a:p>
           <a:p>
@@ -5955,59 +5945,25 @@
             </a:pPr>
             <a:r>
               <a:rPr lang="en-US" dirty="0">
-                <a:latin typeface="Calibri" panose="020F0502020204030204" pitchFamily="34" charset="0"/>
+                <a:effectLst/>
+                <a:latin typeface="-apple-system"/>
                 <a:cs typeface="Calibri" panose="020F0502020204030204" pitchFamily="34" charset="0"/>
               </a:rPr>
-              <a:t>Highest distribution of interest rate lies between 10 to 15.</a:t>
-            </a:r>
-          </a:p>
-          <a:p>
-            <a:pPr>
-              <a:buFont typeface="Wingdings" panose="05000000000000000000" pitchFamily="2" charset="2"/>
-              <a:buChar char="Ø"/>
-            </a:pPr>
-            <a:r>
-              <a:rPr lang="en-US" dirty="0">
-                <a:latin typeface="Calibri" panose="020F0502020204030204" pitchFamily="34" charset="0"/>
-                <a:cs typeface="Calibri" panose="020F0502020204030204" pitchFamily="34" charset="0"/>
-              </a:rPr>
-              <a:t>Highest distribution of DTI lies between 8 to 18.</a:t>
-            </a:r>
-          </a:p>
-          <a:p>
-            <a:pPr>
-              <a:buFont typeface="Wingdings" panose="05000000000000000000" pitchFamily="2" charset="2"/>
-              <a:buChar char="Ø"/>
-            </a:pPr>
-            <a:r>
-              <a:rPr lang="en-US" b="0" i="0" dirty="0">
-                <a:effectLst/>
-                <a:latin typeface="-apple-system"/>
-              </a:rPr>
-              <a:t>A lot of features are quite skewed including annual income.</a:t>
+              <a:t>More number of loans are given to people with 10+ years, 1 year, 2 years experience respectively.</a:t>
             </a:r>
             <a:endParaRPr lang="en-US" dirty="0">
               <a:latin typeface="Calibri" panose="020F0502020204030204" pitchFamily="34" charset="0"/>
               <a:cs typeface="Calibri" panose="020F0502020204030204" pitchFamily="34" charset="0"/>
             </a:endParaRPr>
           </a:p>
-          <a:p>
-            <a:pPr marL="0" indent="0">
-              <a:buNone/>
-            </a:pPr>
-            <a:endParaRPr lang="en-US" dirty="0">
-              <a:latin typeface="Calibri" panose="020F0502020204030204" pitchFamily="34" charset="0"/>
-              <a:cs typeface="Calibri" panose="020F0502020204030204" pitchFamily="34" charset="0"/>
-            </a:endParaRPr>
-          </a:p>
         </p:txBody>
       </p:sp>
       <p:pic>
         <p:nvPicPr>
-          <p:cNvPr id="6" name="Picture 5">
+          <p:cNvPr id="14" name="Picture 13">
             <a:extLst>
               <a:ext uri="{FF2B5EF4-FFF2-40B4-BE49-F238E27FC236}">
-                <a16:creationId xmlns:a16="http://schemas.microsoft.com/office/drawing/2014/main" id="{8DFB137F-0189-62C2-9786-70672DB6BC84}"/>
+                <a16:creationId xmlns:a16="http://schemas.microsoft.com/office/drawing/2014/main" id="{DBB47CEB-7F98-E93B-902D-D1C0E984C689}"/>
               </a:ext>
             </a:extLst>
           </p:cNvPr>
@@ -6024,8 +5980,8 @@
         </p:blipFill>
         <p:spPr>
           <a:xfrm>
-            <a:off x="1261153" y="3906254"/>
-            <a:ext cx="3274511" cy="2342146"/>
+            <a:off x="1261154" y="3571878"/>
+            <a:ext cx="3535626" cy="2580269"/>
           </a:xfrm>
           <a:prstGeom prst="rect">
             <a:avLst/>
@@ -6034,10 +5990,10 @@
       </p:pic>
       <p:pic>
         <p:nvPicPr>
-          <p:cNvPr id="9" name="Picture 8">
+          <p:cNvPr id="16" name="Picture 15">
             <a:extLst>
               <a:ext uri="{FF2B5EF4-FFF2-40B4-BE49-F238E27FC236}">
-                <a16:creationId xmlns:a16="http://schemas.microsoft.com/office/drawing/2014/main" id="{9D4FD6EA-1207-C7A9-BF7D-782992C85599}"/>
+                <a16:creationId xmlns:a16="http://schemas.microsoft.com/office/drawing/2014/main" id="{EDC84C31-DA86-2CED-AF00-4645A097312A}"/>
               </a:ext>
             </a:extLst>
           </p:cNvPr>
@@ -6054,8 +6010,8 @@
         </p:blipFill>
         <p:spPr>
           <a:xfrm>
-            <a:off x="4397741" y="3906254"/>
-            <a:ext cx="3437395" cy="2342146"/>
+            <a:off x="4732356" y="3571878"/>
+            <a:ext cx="3528895" cy="2580269"/>
           </a:xfrm>
           <a:prstGeom prst="rect">
             <a:avLst/>
@@ -6064,10 +6020,10 @@
       </p:pic>
       <p:pic>
         <p:nvPicPr>
-          <p:cNvPr id="11" name="Picture 10">
+          <p:cNvPr id="18" name="Picture 17">
             <a:extLst>
               <a:ext uri="{FF2B5EF4-FFF2-40B4-BE49-F238E27FC236}">
-                <a16:creationId xmlns:a16="http://schemas.microsoft.com/office/drawing/2014/main" id="{3D523AE0-C580-41E9-09A1-2E0B26FAAAC5}"/>
+                <a16:creationId xmlns:a16="http://schemas.microsoft.com/office/drawing/2014/main" id="{E755F7A6-8B2A-563E-912D-B3D6ADBA2947}"/>
               </a:ext>
             </a:extLst>
           </p:cNvPr>
@@ -6084,8 +6040,8 @@
         </p:blipFill>
         <p:spPr>
           <a:xfrm>
-            <a:off x="7692955" y="3906254"/>
-            <a:ext cx="3357459" cy="2342145"/>
+            <a:off x="8203560" y="3571878"/>
+            <a:ext cx="3528897" cy="2580269"/>
           </a:xfrm>
           <a:prstGeom prst="rect">
             <a:avLst/>
@@ -6095,7 +6051,7 @@
     </p:spTree>
     <p:extLst>
       <p:ext uri="{BB962C8B-B14F-4D97-AF65-F5344CB8AC3E}">
-        <p14:creationId xmlns:p14="http://schemas.microsoft.com/office/powerpoint/2010/main" val="1314119323"/>
+        <p14:creationId xmlns:p14="http://schemas.microsoft.com/office/powerpoint/2010/main" val="2014713972"/>
       </p:ext>
     </p:extLst>
   </p:cSld>
@@ -6105,7 +6061,7 @@
 </p:sld>
 </file>
 
-<file path=ppt/slides/slide5.xml><?xml version="1.0" encoding="utf-8"?>
+<file path=ppt/slides/slide7.xml><?xml version="1.0" encoding="utf-8"?>
 <p:sld xmlns:a="http://schemas.openxmlformats.org/drawingml/2006/main" xmlns:r="http://schemas.openxmlformats.org/officeDocument/2006/relationships" xmlns:p="http://schemas.openxmlformats.org/presentationml/2006/main">
   <p:cSld>
     <p:spTree>
@@ -6219,106 +6175,130 @@
           <a:p>
             <a:r>
               <a:rPr lang="en-US" dirty="0"/>
-              <a:t>Univariate Analysis</a:t>
-            </a:r>
-          </a:p>
-        </p:txBody>
-      </p:sp>
-      <p:sp>
-        <p:nvSpPr>
-          <p:cNvPr id="3" name="Content Placeholder 2">
+              <a:t>Bi-variate and Segmented analysis</a:t>
+            </a:r>
+          </a:p>
+        </p:txBody>
+      </p:sp>
+      <p:sp>
+        <p:nvSpPr>
+          <p:cNvPr id="6" name="TextBox 5">
             <a:extLst>
               <a:ext uri="{FF2B5EF4-FFF2-40B4-BE49-F238E27FC236}">
-                <a16:creationId xmlns:a16="http://schemas.microsoft.com/office/drawing/2014/main" id="{31A57B99-F244-461F-A4E9-BA616D17E424}"/>
+                <a16:creationId xmlns:a16="http://schemas.microsoft.com/office/drawing/2014/main" id="{239E8D74-F2DF-D6A9-55B8-9A440D49D8D7}"/>
               </a:ext>
             </a:extLst>
           </p:cNvPr>
-          <p:cNvSpPr>
-            <a:spLocks noGrp="1"/>
-          </p:cNvSpPr>
-          <p:nvPr>
-            <p:ph idx="1"/>
-          </p:nvPr>
-        </p:nvSpPr>
-        <p:spPr>
-          <a:xfrm>
-            <a:off x="1261153" y="1296139"/>
-            <a:ext cx="9965240" cy="2353439"/>
-          </a:xfrm>
-          <a:ln>
-            <a:solidFill>
-              <a:schemeClr val="bg1"/>
-            </a:solidFill>
-          </a:ln>
-        </p:spPr>
-        <p:txBody>
-          <a:bodyPr>
-            <a:normAutofit/>
+          <p:cNvSpPr txBox="1"/>
+          <p:nvPr/>
+        </p:nvSpPr>
+        <p:spPr>
+          <a:xfrm>
+            <a:off x="1141413" y="1828800"/>
+            <a:ext cx="10432966" cy="1282402"/>
+          </a:xfrm>
+          <a:prstGeom prst="rect">
+            <a:avLst/>
+          </a:prstGeom>
+          <a:noFill/>
+        </p:spPr>
+        <p:txBody>
+          <a:bodyPr wrap="square" rtlCol="0">
+            <a:spAutoFit/>
           </a:bodyPr>
           <a:lstStyle/>
           <a:p>
-            <a:pPr marL="0" indent="0">
-              <a:buNone/>
-            </a:pPr>
-            <a:r>
-              <a:rPr lang="en-US" b="1" u="sng" dirty="0">
-                <a:latin typeface="Calibri" panose="020F0502020204030204" pitchFamily="34" charset="0"/>
-                <a:cs typeface="Calibri" panose="020F0502020204030204" pitchFamily="34" charset="0"/>
-              </a:rPr>
-              <a:t>Categorical Variables</a:t>
-            </a:r>
-          </a:p>
-          <a:p>
-            <a:pPr>
+            <a:pPr marL="91440" indent="-91440" defTabSz="914400">
+              <a:lnSpc>
+                <a:spcPct val="90000"/>
+              </a:lnSpc>
+              <a:spcBef>
+                <a:spcPts val="1200"/>
+              </a:spcBef>
+              <a:spcAft>
+                <a:spcPts val="200"/>
+              </a:spcAft>
+              <a:buClr>
+                <a:schemeClr val="accent1"/>
+              </a:buClr>
+              <a:buSzPct val="100000"/>
               <a:buFont typeface="Wingdings" panose="05000000000000000000" pitchFamily="2" charset="2"/>
               <a:buChar char="Ø"/>
             </a:pPr>
             <a:r>
-              <a:rPr lang="en-US" b="0" i="0" dirty="0">
-                <a:effectLst/>
+              <a:rPr lang="en-US" sz="2000" dirty="0">
+                <a:solidFill>
+                  <a:schemeClr val="tx1">
+                    <a:lumMod val="75000"/>
+                    <a:lumOff val="25000"/>
+                  </a:schemeClr>
+                </a:solidFill>
                 <a:latin typeface="-apple-system"/>
               </a:rPr>
-              <a:t>There are around 15 percent charged off loans</a:t>
-            </a:r>
-          </a:p>
-          <a:p>
-            <a:pPr>
+              <a:t>If the loan term is 60 months then there is more chance of being charged off.</a:t>
+            </a:r>
+          </a:p>
+          <a:p>
+            <a:pPr marL="91440" indent="-91440" defTabSz="914400">
+              <a:lnSpc>
+                <a:spcPct val="90000"/>
+              </a:lnSpc>
+              <a:spcBef>
+                <a:spcPts val="1200"/>
+              </a:spcBef>
+              <a:spcAft>
+                <a:spcPts val="200"/>
+              </a:spcAft>
+              <a:buClr>
+                <a:schemeClr val="accent1"/>
+              </a:buClr>
+              <a:buSzPct val="100000"/>
               <a:buFont typeface="Wingdings" panose="05000000000000000000" pitchFamily="2" charset="2"/>
               <a:buChar char="Ø"/>
             </a:pPr>
             <a:r>
-              <a:rPr lang="en-US" dirty="0">
-                <a:effectLst/>
+              <a:rPr lang="en-US" sz="2000" dirty="0">
+                <a:solidFill>
+                  <a:schemeClr val="tx1">
+                    <a:lumMod val="75000"/>
+                    <a:lumOff val="25000"/>
+                  </a:schemeClr>
+                </a:solidFill>
                 <a:latin typeface="-apple-system"/>
               </a:rPr>
-              <a:t>76% of loans term is 36 months rest are 60 months.</a:t>
-            </a:r>
-            <a:endParaRPr lang="en-US" b="0" i="0" dirty="0">
-              <a:effectLst/>
-              <a:latin typeface="-apple-system"/>
-            </a:endParaRPr>
-          </a:p>
-          <a:p>
-            <a:pPr>
+              <a:t>Interest rate is also higher for 60 months compared to 36 months term.</a:t>
+            </a:r>
+          </a:p>
+          <a:p>
+            <a:pPr marL="91440" indent="-91440" defTabSz="914400">
+              <a:lnSpc>
+                <a:spcPct val="90000"/>
+              </a:lnSpc>
+              <a:spcBef>
+                <a:spcPts val="1200"/>
+              </a:spcBef>
+              <a:spcAft>
+                <a:spcPts val="200"/>
+              </a:spcAft>
+              <a:buClr>
+                <a:schemeClr val="accent1"/>
+              </a:buClr>
+              <a:buSzPct val="100000"/>
               <a:buFont typeface="Wingdings" panose="05000000000000000000" pitchFamily="2" charset="2"/>
               <a:buChar char="Ø"/>
             </a:pPr>
             <a:r>
-              <a:rPr lang="en-US" dirty="0">
-                <a:effectLst/>
+              <a:rPr lang="en-IN" sz="2000" dirty="0">
+                <a:solidFill>
+                  <a:schemeClr val="tx1">
+                    <a:lumMod val="75000"/>
+                    <a:lumOff val="25000"/>
+                  </a:schemeClr>
+                </a:solidFill>
                 <a:latin typeface="-apple-system"/>
               </a:rPr>
-              <a:t>Most number(~17500) of loans are taken for debt consolidation</a:t>
-            </a:r>
-          </a:p>
-          <a:p>
-            <a:pPr marL="0" indent="0">
-              <a:buNone/>
-            </a:pPr>
-            <a:endParaRPr lang="en-US" dirty="0">
-              <a:latin typeface="Calibri" panose="020F0502020204030204" pitchFamily="34" charset="0"/>
-              <a:cs typeface="Calibri" panose="020F0502020204030204" pitchFamily="34" charset="0"/>
-            </a:endParaRPr>
+              <a:t>On an average Charge off loans have higher rate of interest.</a:t>
+            </a:r>
           </a:p>
         </p:txBody>
       </p:sp>
@@ -6327,7 +6307,7 @@
           <p:cNvPr id="7" name="Picture 6">
             <a:extLst>
               <a:ext uri="{FF2B5EF4-FFF2-40B4-BE49-F238E27FC236}">
-                <a16:creationId xmlns:a16="http://schemas.microsoft.com/office/drawing/2014/main" id="{336BDE09-9185-246A-9466-1955266F70DA}"/>
+                <a16:creationId xmlns:a16="http://schemas.microsoft.com/office/drawing/2014/main" id="{147BAD60-BE7E-5AF7-E8E6-DD9286831AE3}"/>
               </a:ext>
             </a:extLst>
           </p:cNvPr>
@@ -6344,8 +6324,8 @@
         </p:blipFill>
         <p:spPr>
           <a:xfrm>
-            <a:off x="1261153" y="3208422"/>
-            <a:ext cx="3367894" cy="3039978"/>
+            <a:off x="1141413" y="3112857"/>
+            <a:ext cx="3703303" cy="2837858"/>
           </a:xfrm>
           <a:prstGeom prst="rect">
             <a:avLst/>
@@ -6354,10 +6334,10 @@
       </p:pic>
       <p:pic>
         <p:nvPicPr>
-          <p:cNvPr id="10" name="Picture 9">
+          <p:cNvPr id="11" name="Picture 10">
             <a:extLst>
               <a:ext uri="{FF2B5EF4-FFF2-40B4-BE49-F238E27FC236}">
-                <a16:creationId xmlns:a16="http://schemas.microsoft.com/office/drawing/2014/main" id="{135F3CF8-F45F-EE06-3450-F7E575DFCC5D}"/>
+                <a16:creationId xmlns:a16="http://schemas.microsoft.com/office/drawing/2014/main" id="{113A6955-B6EF-8D28-BBE2-25B7952C9604}"/>
               </a:ext>
             </a:extLst>
           </p:cNvPr>
@@ -6374,8 +6354,8 @@
         </p:blipFill>
         <p:spPr>
           <a:xfrm>
-            <a:off x="4343885" y="3208422"/>
-            <a:ext cx="3583835" cy="2819398"/>
+            <a:off x="4743842" y="3112857"/>
+            <a:ext cx="3565422" cy="2837858"/>
           </a:xfrm>
           <a:prstGeom prst="rect">
             <a:avLst/>
@@ -6384,10 +6364,10 @@
       </p:pic>
       <p:pic>
         <p:nvPicPr>
-          <p:cNvPr id="12" name="Picture 11">
+          <p:cNvPr id="3" name="Picture 2">
             <a:extLst>
               <a:ext uri="{FF2B5EF4-FFF2-40B4-BE49-F238E27FC236}">
-                <a16:creationId xmlns:a16="http://schemas.microsoft.com/office/drawing/2014/main" id="{A218BDC6-3CCB-F3CE-88F9-F3195BF3B40A}"/>
+                <a16:creationId xmlns:a16="http://schemas.microsoft.com/office/drawing/2014/main" id="{E57F7602-3AB7-79CA-C407-32A12C995849}"/>
               </a:ext>
             </a:extLst>
           </p:cNvPr>
@@ -6404,8 +6384,8 @@
         </p:blipFill>
         <p:spPr>
           <a:xfrm>
-            <a:off x="7927720" y="3318710"/>
-            <a:ext cx="3583838" cy="2819400"/>
+            <a:off x="8152674" y="3172952"/>
+            <a:ext cx="3718914" cy="2717668"/>
           </a:xfrm>
           <a:prstGeom prst="rect">
             <a:avLst/>
@@ -6415,7 +6395,7 @@
     </p:spTree>
     <p:extLst>
       <p:ext uri="{BB962C8B-B14F-4D97-AF65-F5344CB8AC3E}">
-        <p14:creationId xmlns:p14="http://schemas.microsoft.com/office/powerpoint/2010/main" val="3627380008"/>
+        <p14:creationId xmlns:p14="http://schemas.microsoft.com/office/powerpoint/2010/main" val="14695710"/>
       </p:ext>
     </p:extLst>
   </p:cSld>
@@ -6425,7 +6405,7 @@
 </p:sld>
 </file>
 
-<file path=ppt/slides/slide6.xml><?xml version="1.0" encoding="utf-8"?>
+<file path=ppt/slides/slide8.xml><?xml version="1.0" encoding="utf-8"?>
 <p:sld xmlns:a="http://schemas.openxmlformats.org/drawingml/2006/main" xmlns:r="http://schemas.openxmlformats.org/officeDocument/2006/relationships" xmlns:p="http://schemas.openxmlformats.org/presentationml/2006/main">
   <p:cSld>
     <p:spTree>
@@ -6458,11 +6438,6 @@
             <p:custDataLst>
               <p:tags r:id="rId1"/>
             </p:custDataLst>
-            <p:extLst>
-              <p:ext uri="{D42A27DB-BD31-4B8C-83A1-F6EECF244321}">
-                <p14:modId xmlns:p14="http://schemas.microsoft.com/office/powerpoint/2010/main" val="1213879465"/>
-              </p:ext>
-            </p:extLst>
           </p:nvPr>
         </p:nvGraphicFramePr>
         <p:xfrm>
@@ -6544,108 +6519,139 @@
           <a:p>
             <a:r>
               <a:rPr lang="en-US" dirty="0"/>
-              <a:t>Univariate Analysis</a:t>
-            </a:r>
-          </a:p>
-        </p:txBody>
-      </p:sp>
-      <p:sp>
-        <p:nvSpPr>
-          <p:cNvPr id="3" name="Content Placeholder 2">
+              <a:t>Bi-variate and Segmented analysis</a:t>
+            </a:r>
+          </a:p>
+        </p:txBody>
+      </p:sp>
+      <p:sp>
+        <p:nvSpPr>
+          <p:cNvPr id="6" name="TextBox 5">
             <a:extLst>
               <a:ext uri="{FF2B5EF4-FFF2-40B4-BE49-F238E27FC236}">
-                <a16:creationId xmlns:a16="http://schemas.microsoft.com/office/drawing/2014/main" id="{31A57B99-F244-461F-A4E9-BA616D17E424}"/>
+                <a16:creationId xmlns:a16="http://schemas.microsoft.com/office/drawing/2014/main" id="{239E8D74-F2DF-D6A9-55B8-9A440D49D8D7}"/>
               </a:ext>
             </a:extLst>
           </p:cNvPr>
-          <p:cNvSpPr>
-            <a:spLocks noGrp="1"/>
-          </p:cNvSpPr>
-          <p:nvPr>
-            <p:ph idx="1"/>
-          </p:nvPr>
-        </p:nvSpPr>
-        <p:spPr>
-          <a:xfrm>
-            <a:off x="1261153" y="1296139"/>
-            <a:ext cx="9965240" cy="2275739"/>
-          </a:xfrm>
-          <a:ln>
-            <a:solidFill>
-              <a:schemeClr val="bg1"/>
-            </a:solidFill>
-          </a:ln>
-        </p:spPr>
-        <p:txBody>
-          <a:bodyPr>
-            <a:normAutofit/>
+          <p:cNvSpPr txBox="1"/>
+          <p:nvPr/>
+        </p:nvSpPr>
+        <p:spPr>
+          <a:xfrm>
+            <a:off x="1141413" y="1828800"/>
+            <a:ext cx="10432966" cy="1282402"/>
+          </a:xfrm>
+          <a:prstGeom prst="rect">
+            <a:avLst/>
+          </a:prstGeom>
+          <a:noFill/>
+        </p:spPr>
+        <p:txBody>
+          <a:bodyPr wrap="square" rtlCol="0">
+            <a:spAutoFit/>
           </a:bodyPr>
           <a:lstStyle/>
           <a:p>
-            <a:pPr marL="0" indent="0">
-              <a:buNone/>
-            </a:pPr>
-            <a:r>
-              <a:rPr lang="en-US" b="1" u="sng" dirty="0">
-                <a:latin typeface="Calibri" panose="020F0502020204030204" pitchFamily="34" charset="0"/>
-                <a:cs typeface="Calibri" panose="020F0502020204030204" pitchFamily="34" charset="0"/>
-              </a:rPr>
-              <a:t>Categorical Variables</a:t>
-            </a:r>
-          </a:p>
-          <a:p>
-            <a:pPr>
+            <a:pPr marL="91440" indent="-91440" defTabSz="914400">
+              <a:lnSpc>
+                <a:spcPct val="90000"/>
+              </a:lnSpc>
+              <a:spcBef>
+                <a:spcPts val="1200"/>
+              </a:spcBef>
+              <a:spcAft>
+                <a:spcPts val="200"/>
+              </a:spcAft>
+              <a:buClr>
+                <a:schemeClr val="accent1"/>
+              </a:buClr>
+              <a:buSzPct val="100000"/>
               <a:buFont typeface="Wingdings" panose="05000000000000000000" pitchFamily="2" charset="2"/>
               <a:buChar char="Ø"/>
             </a:pPr>
             <a:r>
-              <a:rPr lang="en-US" dirty="0">
-                <a:effectLst/>
+              <a:rPr lang="en-US" sz="2000" dirty="0">
+                <a:solidFill>
+                  <a:schemeClr val="tx1">
+                    <a:lumMod val="75000"/>
+                    <a:lumOff val="25000"/>
+                  </a:schemeClr>
+                </a:solidFill>
                 <a:latin typeface="-apple-system"/>
               </a:rPr>
-              <a:t>States CA, NY, FL, Tx has highest number of loans.</a:t>
-            </a:r>
-          </a:p>
-          <a:p>
-            <a:pPr>
+              <a:t>Loans taken for Small business has a high percentage of charge off's.</a:t>
+            </a:r>
+          </a:p>
+          <a:p>
+            <a:pPr marL="91440" indent="-91440" defTabSz="914400">
+              <a:lnSpc>
+                <a:spcPct val="90000"/>
+              </a:lnSpc>
+              <a:spcBef>
+                <a:spcPts val="1200"/>
+              </a:spcBef>
+              <a:spcAft>
+                <a:spcPts val="200"/>
+              </a:spcAft>
+              <a:buClr>
+                <a:schemeClr val="accent1"/>
+              </a:buClr>
+              <a:buSzPct val="100000"/>
               <a:buFont typeface="Wingdings" panose="05000000000000000000" pitchFamily="2" charset="2"/>
               <a:buChar char="Ø"/>
             </a:pPr>
             <a:r>
-              <a:rPr lang="en-US" dirty="0">
-                <a:effectLst/>
+              <a:rPr lang="en-US" sz="2000" dirty="0">
+                <a:solidFill>
+                  <a:schemeClr val="tx1">
+                    <a:lumMod val="75000"/>
+                    <a:lumOff val="25000"/>
+                  </a:schemeClr>
+                </a:solidFill>
                 <a:latin typeface="-apple-system"/>
-                <a:cs typeface="Calibri" panose="020F0502020204030204" pitchFamily="34" charset="0"/>
               </a:rPr>
-              <a:t>Most number of loans are given to Grad A, B, C, D.</a:t>
-            </a:r>
-          </a:p>
-          <a:p>
-            <a:pPr>
+              <a:t>NE State has the highest charged-off percentage(almost 60 percent).</a:t>
+            </a:r>
+          </a:p>
+          <a:p>
+            <a:pPr marL="91440" indent="-91440" defTabSz="914400">
+              <a:lnSpc>
+                <a:spcPct val="90000"/>
+              </a:lnSpc>
+              <a:spcBef>
+                <a:spcPts val="1200"/>
+              </a:spcBef>
+              <a:spcAft>
+                <a:spcPts val="200"/>
+              </a:spcAft>
+              <a:buClr>
+                <a:schemeClr val="accent1"/>
+              </a:buClr>
+              <a:buSzPct val="100000"/>
               <a:buFont typeface="Wingdings" panose="05000000000000000000" pitchFamily="2" charset="2"/>
               <a:buChar char="Ø"/>
             </a:pPr>
             <a:r>
-              <a:rPr lang="en-US" dirty="0">
-                <a:effectLst/>
+              <a:rPr lang="en-US" sz="2000" dirty="0">
+                <a:solidFill>
+                  <a:schemeClr val="tx1">
+                    <a:lumMod val="75000"/>
+                    <a:lumOff val="25000"/>
+                  </a:schemeClr>
+                </a:solidFill>
                 <a:latin typeface="-apple-system"/>
-                <a:cs typeface="Calibri" panose="020F0502020204030204" pitchFamily="34" charset="0"/>
               </a:rPr>
-              <a:t>More number of loans are given to people with 10+ years, 1 year, 2 years experience respectively.</a:t>
-            </a:r>
-            <a:endParaRPr lang="en-US" dirty="0">
-              <a:latin typeface="Calibri" panose="020F0502020204030204" pitchFamily="34" charset="0"/>
-              <a:cs typeface="Calibri" panose="020F0502020204030204" pitchFamily="34" charset="0"/>
-            </a:endParaRPr>
+              <a:t>CA State has a large number of charged-off loans.</a:t>
+            </a:r>
           </a:p>
         </p:txBody>
       </p:sp>
       <p:pic>
         <p:nvPicPr>
-          <p:cNvPr id="14" name="Picture 13">
+          <p:cNvPr id="7" name="Picture 6">
             <a:extLst>
               <a:ext uri="{FF2B5EF4-FFF2-40B4-BE49-F238E27FC236}">
-                <a16:creationId xmlns:a16="http://schemas.microsoft.com/office/drawing/2014/main" id="{DBB47CEB-7F98-E93B-902D-D1C0E984C689}"/>
+                <a16:creationId xmlns:a16="http://schemas.microsoft.com/office/drawing/2014/main" id="{F86ED286-77E3-2668-2664-2E0AC9AA1491}"/>
               </a:ext>
             </a:extLst>
           </p:cNvPr>
@@ -6662,8 +6668,8 @@
         </p:blipFill>
         <p:spPr>
           <a:xfrm>
-            <a:off x="1261154" y="3571878"/>
-            <a:ext cx="3535626" cy="2580269"/>
+            <a:off x="1141414" y="3084681"/>
+            <a:ext cx="3959976" cy="3228608"/>
           </a:xfrm>
           <a:prstGeom prst="rect">
             <a:avLst/>
@@ -6672,10 +6678,10 @@
       </p:pic>
       <p:pic>
         <p:nvPicPr>
-          <p:cNvPr id="16" name="Picture 15">
+          <p:cNvPr id="9" name="Picture 8">
             <a:extLst>
               <a:ext uri="{FF2B5EF4-FFF2-40B4-BE49-F238E27FC236}">
-                <a16:creationId xmlns:a16="http://schemas.microsoft.com/office/drawing/2014/main" id="{EDC84C31-DA86-2CED-AF00-4645A097312A}"/>
+                <a16:creationId xmlns:a16="http://schemas.microsoft.com/office/drawing/2014/main" id="{1585E62A-9A90-8517-A4C9-8C74CCA6F511}"/>
               </a:ext>
             </a:extLst>
           </p:cNvPr>
@@ -6692,38 +6698,8 @@
         </p:blipFill>
         <p:spPr>
           <a:xfrm>
-            <a:off x="4732356" y="3571878"/>
-            <a:ext cx="3528895" cy="2580269"/>
-          </a:xfrm>
-          <a:prstGeom prst="rect">
-            <a:avLst/>
-          </a:prstGeom>
-        </p:spPr>
-      </p:pic>
-      <p:pic>
-        <p:nvPicPr>
-          <p:cNvPr id="18" name="Picture 17">
-            <a:extLst>
-              <a:ext uri="{FF2B5EF4-FFF2-40B4-BE49-F238E27FC236}">
-                <a16:creationId xmlns:a16="http://schemas.microsoft.com/office/drawing/2014/main" id="{E755F7A6-8B2A-563E-912D-B3D6ADBA2947}"/>
-              </a:ext>
-            </a:extLst>
-          </p:cNvPr>
-          <p:cNvPicPr>
-            <a:picLocks noChangeAspect="1"/>
-          </p:cNvPicPr>
-          <p:nvPr/>
-        </p:nvPicPr>
-        <p:blipFill>
-          <a:blip r:embed="rId7"/>
-          <a:stretch>
-            <a:fillRect/>
-          </a:stretch>
-        </p:blipFill>
-        <p:spPr>
-          <a:xfrm>
-            <a:off x="8203560" y="3571878"/>
-            <a:ext cx="3528897" cy="2580269"/>
+            <a:off x="5722363" y="3101054"/>
+            <a:ext cx="4199679" cy="3060691"/>
           </a:xfrm>
           <a:prstGeom prst="rect">
             <a:avLst/>
@@ -6733,7 +6709,7 @@
     </p:spTree>
     <p:extLst>
       <p:ext uri="{BB962C8B-B14F-4D97-AF65-F5344CB8AC3E}">
-        <p14:creationId xmlns:p14="http://schemas.microsoft.com/office/powerpoint/2010/main" val="2014713972"/>
+        <p14:creationId xmlns:p14="http://schemas.microsoft.com/office/powerpoint/2010/main" val="2903740383"/>
       </p:ext>
     </p:extLst>
   </p:cSld>
@@ -6743,7 +6719,7 @@
 </p:sld>
 </file>
 
-<file path=ppt/slides/slide7.xml><?xml version="1.0" encoding="utf-8"?>
+<file path=ppt/slides/slide9.xml><?xml version="1.0" encoding="utf-8"?>
 <p:sld xmlns:a="http://schemas.openxmlformats.org/drawingml/2006/main" xmlns:r="http://schemas.openxmlformats.org/officeDocument/2006/relationships" xmlns:p="http://schemas.openxmlformats.org/presentationml/2006/main">
   <p:cSld>
     <p:spTree>
@@ -6877,7 +6853,7 @@
         <p:spPr>
           <a:xfrm>
             <a:off x="1141413" y="1828800"/>
-            <a:ext cx="10432966" cy="1585049"/>
+            <a:ext cx="10432966" cy="3053144"/>
           </a:xfrm>
           <a:prstGeom prst="rect">
             <a:avLst/>
@@ -6908,7 +6884,7 @@
               <a:buChar char="Ø"/>
             </a:pPr>
             <a:r>
-              <a:rPr lang="en-IN" sz="2000" dirty="0">
+              <a:rPr lang="en-US" sz="2000" dirty="0">
                 <a:solidFill>
                   <a:schemeClr val="tx1">
                     <a:lumMod val="75000"/>
@@ -6917,7 +6893,7 @@
                 </a:solidFill>
                 <a:latin typeface="-apple-system"/>
               </a:rPr>
-              <a:t>On an average Charge off loans have higher rate of interest.</a:t>
+              <a:t>Grades E, F, and G have high-interest rates and percentages of charged-off loans.</a:t>
             </a:r>
           </a:p>
           <a:p>
@@ -6948,7 +6924,7 @@
                 </a:solidFill>
                 <a:latin typeface="-apple-system"/>
               </a:rPr>
-              <a:t>The Charged off loans have more inquiries compared to fully paid loans</a:t>
+              <a:t>If we look into subgrades F5 and G3 have more than 40 percent charged off loans.</a:t>
             </a:r>
           </a:p>
           <a:p>
@@ -6979,276 +6955,33 @@
                 </a:solidFill>
                 <a:latin typeface="-apple-system"/>
               </a:rPr>
-              <a:t>Revolving line utilization rate is higher for charges off loans</a:t>
-            </a:r>
-            <a:endParaRPr lang="en-IN" sz="2000" dirty="0">
-              <a:solidFill>
-                <a:schemeClr val="tx1">
-                  <a:lumMod val="75000"/>
-                  <a:lumOff val="25000"/>
-                </a:schemeClr>
-              </a:solidFill>
-              <a:latin typeface="-apple-system"/>
-            </a:endParaRPr>
-          </a:p>
-          <a:p>
-            <a:pPr marL="285750" indent="-285750">
-              <a:buFont typeface="Wingdings" panose="05000000000000000000" pitchFamily="2" charset="2"/>
-              <a:buChar char="Ø"/>
-            </a:pPr>
-            <a:endParaRPr lang="en-IN" dirty="0"/>
-          </a:p>
-        </p:txBody>
-      </p:sp>
-      <p:pic>
-        <p:nvPicPr>
-          <p:cNvPr id="8" name="Picture 7">
-            <a:extLst>
-              <a:ext uri="{FF2B5EF4-FFF2-40B4-BE49-F238E27FC236}">
-                <a16:creationId xmlns:a16="http://schemas.microsoft.com/office/drawing/2014/main" id="{39584E13-A1E2-2BE7-B177-0D0EF16FBF73}"/>
-              </a:ext>
-            </a:extLst>
-          </p:cNvPr>
-          <p:cNvPicPr>
-            <a:picLocks noChangeAspect="1"/>
-          </p:cNvPicPr>
-          <p:nvPr/>
-        </p:nvPicPr>
-        <p:blipFill>
-          <a:blip r:embed="rId5"/>
-          <a:stretch>
-            <a:fillRect/>
-          </a:stretch>
-        </p:blipFill>
-        <p:spPr>
-          <a:xfrm>
-            <a:off x="1141413" y="3341411"/>
-            <a:ext cx="3549914" cy="2594168"/>
-          </a:xfrm>
-          <a:prstGeom prst="rect">
-            <a:avLst/>
-          </a:prstGeom>
-        </p:spPr>
-      </p:pic>
-      <p:pic>
-        <p:nvPicPr>
-          <p:cNvPr id="10" name="Picture 9">
-            <a:extLst>
-              <a:ext uri="{FF2B5EF4-FFF2-40B4-BE49-F238E27FC236}">
-                <a16:creationId xmlns:a16="http://schemas.microsoft.com/office/drawing/2014/main" id="{26C64F0E-B019-09B3-8DE7-2BC288DD81E2}"/>
-              </a:ext>
-            </a:extLst>
-          </p:cNvPr>
-          <p:cNvPicPr>
-            <a:picLocks noChangeAspect="1"/>
-          </p:cNvPicPr>
-          <p:nvPr/>
-        </p:nvPicPr>
-        <p:blipFill>
-          <a:blip r:embed="rId6"/>
-          <a:stretch>
-            <a:fillRect/>
-          </a:stretch>
-        </p:blipFill>
-        <p:spPr>
-          <a:xfrm>
-            <a:off x="4591397" y="3341410"/>
-            <a:ext cx="3727915" cy="2594167"/>
-          </a:xfrm>
-          <a:prstGeom prst="rect">
-            <a:avLst/>
-          </a:prstGeom>
-        </p:spPr>
-      </p:pic>
-      <p:pic>
-        <p:nvPicPr>
-          <p:cNvPr id="5" name="Picture 4">
-            <a:extLst>
-              <a:ext uri="{FF2B5EF4-FFF2-40B4-BE49-F238E27FC236}">
-                <a16:creationId xmlns:a16="http://schemas.microsoft.com/office/drawing/2014/main" id="{C4274C50-7518-026E-0CBB-5D6A3E0B3206}"/>
-              </a:ext>
-            </a:extLst>
-          </p:cNvPr>
-          <p:cNvPicPr>
-            <a:picLocks noChangeAspect="1"/>
-          </p:cNvPicPr>
-          <p:nvPr/>
-        </p:nvPicPr>
-        <p:blipFill>
-          <a:blip r:embed="rId7"/>
-          <a:stretch>
-            <a:fillRect/>
-          </a:stretch>
-        </p:blipFill>
-        <p:spPr>
-          <a:xfrm>
-            <a:off x="8062575" y="3341411"/>
-            <a:ext cx="3697724" cy="2594166"/>
-          </a:xfrm>
-          <a:prstGeom prst="rect">
-            <a:avLst/>
-          </a:prstGeom>
-        </p:spPr>
-      </p:pic>
-    </p:spTree>
-    <p:extLst>
-      <p:ext uri="{BB962C8B-B14F-4D97-AF65-F5344CB8AC3E}">
-        <p14:creationId xmlns:p14="http://schemas.microsoft.com/office/powerpoint/2010/main" val="4186836207"/>
-      </p:ext>
-    </p:extLst>
-  </p:cSld>
-  <p:clrMapOvr>
-    <a:masterClrMapping/>
-  </p:clrMapOvr>
-</p:sld>
-</file>
-
-<file path=ppt/slides/slide8.xml><?xml version="1.0" encoding="utf-8"?>
-<p:sld xmlns:a="http://schemas.openxmlformats.org/drawingml/2006/main" xmlns:r="http://schemas.openxmlformats.org/officeDocument/2006/relationships" xmlns:p="http://schemas.openxmlformats.org/presentationml/2006/main">
-  <p:cSld>
-    <p:spTree>
-      <p:nvGrpSpPr>
-        <p:cNvPr id="1" name=""/>
-        <p:cNvGrpSpPr/>
-        <p:nvPr/>
-      </p:nvGrpSpPr>
-      <p:grpSpPr>
-        <a:xfrm>
-          <a:off x="0" y="0"/>
-          <a:ext cx="0" cy="0"/>
-          <a:chOff x="0" y="0"/>
-          <a:chExt cx="0" cy="0"/>
-        </a:xfrm>
-      </p:grpSpPr>
-      <p:graphicFrame>
-        <p:nvGraphicFramePr>
-          <p:cNvPr id="4" name="Object 3" hidden="1">
-            <a:extLst>
-              <a:ext uri="{FF2B5EF4-FFF2-40B4-BE49-F238E27FC236}">
-                <a16:creationId xmlns:a16="http://schemas.microsoft.com/office/drawing/2014/main" id="{D6C5948B-EBDC-4BC7-B296-690BCA97CA05}"/>
-              </a:ext>
-            </a:extLst>
-          </p:cNvPr>
-          <p:cNvGraphicFramePr>
-            <a:graphicFrameLocks noChangeAspect="1"/>
-          </p:cNvGraphicFramePr>
-          <p:nvPr>
-            <p:custDataLst>
-              <p:tags r:id="rId1"/>
-            </p:custDataLst>
-          </p:nvPr>
-        </p:nvGraphicFramePr>
-        <p:xfrm>
-          <a:off x="1588" y="1588"/>
-          <a:ext cx="1588" cy="1588"/>
-        </p:xfrm>
-        <a:graphic>
-          <a:graphicData uri="http://schemas.openxmlformats.org/presentationml/2006/ole">
-            <mc:AlternateContent xmlns:mc="http://schemas.openxmlformats.org/markup-compatibility/2006">
-              <mc:Choice xmlns:v="urn:schemas-microsoft-com:vml" Requires="v">
-                <p:oleObj name="think-cell Slide" r:id="rId3" imgW="473" imgH="473" progId="TCLayout.ActiveDocument.1">
-                  <p:embed/>
-                </p:oleObj>
-              </mc:Choice>
-              <mc:Fallback>
-                <p:oleObj name="think-cell Slide" r:id="rId3" imgW="473" imgH="473" progId="TCLayout.ActiveDocument.1">
-                  <p:embed/>
-                  <p:pic>
-                    <p:nvPicPr>
-                      <p:cNvPr id="4" name="Object 3" hidden="1">
-                        <a:extLst>
-                          <a:ext uri="{FF2B5EF4-FFF2-40B4-BE49-F238E27FC236}">
-                            <a16:creationId xmlns:a16="http://schemas.microsoft.com/office/drawing/2014/main" id="{D6C5948B-EBDC-4BC7-B296-690BCA97CA05}"/>
-                          </a:ext>
-                        </a:extLst>
-                      </p:cNvPr>
-                      <p:cNvPicPr/>
-                      <p:nvPr/>
-                    </p:nvPicPr>
-                    <p:blipFill>
-                      <a:blip r:embed="rId4"/>
-                      <a:stretch>
-                        <a:fillRect/>
-                      </a:stretch>
-                    </p:blipFill>
-                    <p:spPr>
-                      <a:xfrm>
-                        <a:off x="1588" y="1588"/>
-                        <a:ext cx="1588" cy="1588"/>
-                      </a:xfrm>
-                      <a:prstGeom prst="rect">
-                        <a:avLst/>
-                      </a:prstGeom>
-                    </p:spPr>
-                  </p:pic>
-                </p:oleObj>
-              </mc:Fallback>
-            </mc:AlternateContent>
-          </a:graphicData>
-        </a:graphic>
-      </p:graphicFrame>
-      <p:sp>
-        <p:nvSpPr>
-          <p:cNvPr id="2" name="Title 1">
-            <a:extLst>
-              <a:ext uri="{FF2B5EF4-FFF2-40B4-BE49-F238E27FC236}">
-                <a16:creationId xmlns:a16="http://schemas.microsoft.com/office/drawing/2014/main" id="{109596E1-A18E-4397-8DCE-778F5C1FB128}"/>
-              </a:ext>
-            </a:extLst>
-          </p:cNvPr>
-          <p:cNvSpPr>
-            <a:spLocks noGrp="1"/>
-          </p:cNvSpPr>
-          <p:nvPr>
-            <p:ph type="title"/>
-          </p:nvPr>
-        </p:nvSpPr>
-        <p:spPr>
-          <a:xfrm>
-            <a:off x="1141413" y="609600"/>
-            <a:ext cx="9905998" cy="686540"/>
-          </a:xfrm>
-        </p:spPr>
-        <p:txBody>
-          <a:bodyPr vert="horz">
-            <a:normAutofit fontScale="90000"/>
-          </a:bodyPr>
-          <a:lstStyle/>
-          <a:p>
-            <a:r>
-              <a:rPr lang="en-US" dirty="0"/>
-              <a:t>Bi-variate and Segmented analysis</a:t>
-            </a:r>
-          </a:p>
-        </p:txBody>
-      </p:sp>
-      <p:sp>
-        <p:nvSpPr>
-          <p:cNvPr id="6" name="TextBox 5">
-            <a:extLst>
-              <a:ext uri="{FF2B5EF4-FFF2-40B4-BE49-F238E27FC236}">
-                <a16:creationId xmlns:a16="http://schemas.microsoft.com/office/drawing/2014/main" id="{239E8D74-F2DF-D6A9-55B8-9A440D49D8D7}"/>
-              </a:ext>
-            </a:extLst>
-          </p:cNvPr>
-          <p:cNvSpPr txBox="1"/>
-          <p:nvPr/>
-        </p:nvSpPr>
-        <p:spPr>
-          <a:xfrm>
-            <a:off x="1141413" y="1828800"/>
-            <a:ext cx="10432966" cy="1585049"/>
-          </a:xfrm>
-          <a:prstGeom prst="rect">
-            <a:avLst/>
-          </a:prstGeom>
-          <a:noFill/>
-        </p:spPr>
-        <p:txBody>
-          <a:bodyPr wrap="square" rtlCol="0">
-            <a:spAutoFit/>
-          </a:bodyPr>
-          <a:lstStyle/>
+              <a:t>If </a:t>
+            </a:r>
+            <a:r>
+              <a:rPr lang="en-US" sz="2000" dirty="0" err="1">
+                <a:solidFill>
+                  <a:schemeClr val="tx1">
+                    <a:lumMod val="75000"/>
+                    <a:lumOff val="25000"/>
+                  </a:schemeClr>
+                </a:solidFill>
+                <a:latin typeface="-apple-system"/>
+              </a:rPr>
+              <a:t>pub_rec_bankruptcies</a:t>
+            </a:r>
+            <a:r>
+              <a:rPr lang="en-US" sz="2000" dirty="0">
+                <a:solidFill>
+                  <a:schemeClr val="tx1">
+                    <a:lumMod val="75000"/>
+                    <a:lumOff val="25000"/>
+                  </a:schemeClr>
+                </a:solidFill>
+                <a:latin typeface="-apple-system"/>
+              </a:rPr>
+              <a:t> is high then also there is more chance of being Charged off.</a:t>
+            </a:r>
+          </a:p>
           <a:p>
             <a:pPr marL="91440" indent="-91440" defTabSz="914400">
               <a:lnSpc>
@@ -7277,7 +7010,7 @@
                 </a:solidFill>
                 <a:latin typeface="-apple-system"/>
               </a:rPr>
-              <a:t>If the loan term is 60 months then there is more chance of being charged off.</a:t>
+              <a:t>Charge-off percentage is slightly high(~2-4) for DTI range is between 15 to 27.</a:t>
             </a:r>
           </a:p>
           <a:p>
@@ -7308,7 +7041,17 @@
                 </a:solidFill>
                 <a:latin typeface="-apple-system"/>
               </a:rPr>
-              <a:t>Interest rate is also higher for 60 months compared to 36 months term.</a:t>
+              <a:t>Charge-off is slightly high if the loan amount is greater than 30K</a:t>
+            </a:r>
+            <a:r>
+              <a:rPr lang="en-US" b="0" i="0" dirty="0">
+                <a:solidFill>
+                  <a:srgbClr val="000000"/>
+                </a:solidFill>
+                <a:effectLst/>
+                <a:latin typeface="Helvetica Neue"/>
+              </a:rPr>
+              <a:t>.</a:t>
             </a:r>
           </a:p>
           <a:p>
@@ -7330,7 +7073,7 @@
               <a:buChar char="Ø"/>
             </a:pPr>
             <a:r>
-              <a:rPr lang="en-US" sz="2000" dirty="0">
+              <a:rPr lang="en-US" sz="1800" dirty="0">
                 <a:solidFill>
                   <a:schemeClr val="tx1">
                     <a:lumMod val="75000"/>
@@ -7339,267 +7082,18 @@
                 </a:solidFill>
                 <a:latin typeface="-apple-system"/>
               </a:rPr>
-              <a:t>Grades E, F, and G have high-interest rates and percentages of charged-off loans.</a:t>
-            </a:r>
-          </a:p>
-          <a:p>
-            <a:pPr marL="285750" indent="-285750">
-              <a:buFont typeface="Wingdings" panose="05000000000000000000" pitchFamily="2" charset="2"/>
-              <a:buChar char="Ø"/>
-            </a:pPr>
-            <a:endParaRPr lang="en-IN" dirty="0"/>
-          </a:p>
-        </p:txBody>
-      </p:sp>
-      <p:pic>
-        <p:nvPicPr>
-          <p:cNvPr id="7" name="Picture 6">
-            <a:extLst>
-              <a:ext uri="{FF2B5EF4-FFF2-40B4-BE49-F238E27FC236}">
-                <a16:creationId xmlns:a16="http://schemas.microsoft.com/office/drawing/2014/main" id="{147BAD60-BE7E-5AF7-E8E6-DD9286831AE3}"/>
-              </a:ext>
-            </a:extLst>
-          </p:cNvPr>
-          <p:cNvPicPr>
-            <a:picLocks noChangeAspect="1"/>
-          </p:cNvPicPr>
-          <p:nvPr/>
-        </p:nvPicPr>
-        <p:blipFill>
-          <a:blip r:embed="rId5"/>
-          <a:stretch>
-            <a:fillRect/>
-          </a:stretch>
-        </p:blipFill>
-        <p:spPr>
-          <a:xfrm>
-            <a:off x="1133548" y="3113763"/>
-            <a:ext cx="3703303" cy="2837858"/>
-          </a:xfrm>
-          <a:prstGeom prst="rect">
-            <a:avLst/>
-          </a:prstGeom>
-        </p:spPr>
-      </p:pic>
-      <p:pic>
-        <p:nvPicPr>
-          <p:cNvPr id="8" name="Picture 7">
-            <a:extLst>
-              <a:ext uri="{FF2B5EF4-FFF2-40B4-BE49-F238E27FC236}">
-                <a16:creationId xmlns:a16="http://schemas.microsoft.com/office/drawing/2014/main" id="{E09A2B20-BC80-F710-379B-169296FF5760}"/>
-              </a:ext>
-            </a:extLst>
-          </p:cNvPr>
-          <p:cNvPicPr>
-            <a:picLocks noChangeAspect="1"/>
-          </p:cNvPicPr>
-          <p:nvPr/>
-        </p:nvPicPr>
-        <p:blipFill>
-          <a:blip r:embed="rId6"/>
-          <a:stretch>
-            <a:fillRect/>
-          </a:stretch>
-        </p:blipFill>
-        <p:spPr>
-          <a:xfrm>
-            <a:off x="8270321" y="3237271"/>
-            <a:ext cx="3703303" cy="2713443"/>
-          </a:xfrm>
-          <a:prstGeom prst="rect">
-            <a:avLst/>
-          </a:prstGeom>
-        </p:spPr>
-      </p:pic>
-      <p:pic>
-        <p:nvPicPr>
-          <p:cNvPr id="11" name="Picture 10">
-            <a:extLst>
-              <a:ext uri="{FF2B5EF4-FFF2-40B4-BE49-F238E27FC236}">
-                <a16:creationId xmlns:a16="http://schemas.microsoft.com/office/drawing/2014/main" id="{113A6955-B6EF-8D28-BBE2-25B7952C9604}"/>
-              </a:ext>
-            </a:extLst>
-          </p:cNvPr>
-          <p:cNvPicPr>
-            <a:picLocks noChangeAspect="1"/>
-          </p:cNvPicPr>
-          <p:nvPr/>
-        </p:nvPicPr>
-        <p:blipFill>
-          <a:blip r:embed="rId7"/>
-          <a:stretch>
-            <a:fillRect/>
-          </a:stretch>
-        </p:blipFill>
-        <p:spPr>
-          <a:xfrm>
-            <a:off x="4770875" y="3112857"/>
-            <a:ext cx="3565422" cy="2837858"/>
-          </a:xfrm>
-          <a:prstGeom prst="rect">
-            <a:avLst/>
-          </a:prstGeom>
-        </p:spPr>
-      </p:pic>
-    </p:spTree>
-    <p:extLst>
-      <p:ext uri="{BB962C8B-B14F-4D97-AF65-F5344CB8AC3E}">
-        <p14:creationId xmlns:p14="http://schemas.microsoft.com/office/powerpoint/2010/main" val="14695710"/>
-      </p:ext>
-    </p:extLst>
-  </p:cSld>
-  <p:clrMapOvr>
-    <a:masterClrMapping/>
-  </p:clrMapOvr>
-</p:sld>
-</file>
-
-<file path=ppt/slides/slide9.xml><?xml version="1.0" encoding="utf-8"?>
-<p:sld xmlns:a="http://schemas.openxmlformats.org/drawingml/2006/main" xmlns:r="http://schemas.openxmlformats.org/officeDocument/2006/relationships" xmlns:p="http://schemas.openxmlformats.org/presentationml/2006/main">
-  <p:cSld>
-    <p:spTree>
-      <p:nvGrpSpPr>
-        <p:cNvPr id="1" name=""/>
-        <p:cNvGrpSpPr/>
-        <p:nvPr/>
-      </p:nvGrpSpPr>
-      <p:grpSpPr>
-        <a:xfrm>
-          <a:off x="0" y="0"/>
-          <a:ext cx="0" cy="0"/>
-          <a:chOff x="0" y="0"/>
-          <a:chExt cx="0" cy="0"/>
-        </a:xfrm>
-      </p:grpSpPr>
-      <p:graphicFrame>
-        <p:nvGraphicFramePr>
-          <p:cNvPr id="4" name="Object 3" hidden="1">
-            <a:extLst>
-              <a:ext uri="{FF2B5EF4-FFF2-40B4-BE49-F238E27FC236}">
-                <a16:creationId xmlns:a16="http://schemas.microsoft.com/office/drawing/2014/main" id="{D6C5948B-EBDC-4BC7-B296-690BCA97CA05}"/>
-              </a:ext>
-            </a:extLst>
-          </p:cNvPr>
-          <p:cNvGraphicFramePr>
-            <a:graphicFrameLocks noChangeAspect="1"/>
-          </p:cNvGraphicFramePr>
-          <p:nvPr>
-            <p:custDataLst>
-              <p:tags r:id="rId1"/>
-            </p:custDataLst>
-          </p:nvPr>
-        </p:nvGraphicFramePr>
-        <p:xfrm>
-          <a:off x="1588" y="1588"/>
-          <a:ext cx="1588" cy="1588"/>
-        </p:xfrm>
-        <a:graphic>
-          <a:graphicData uri="http://schemas.openxmlformats.org/presentationml/2006/ole">
-            <mc:AlternateContent xmlns:mc="http://schemas.openxmlformats.org/markup-compatibility/2006">
-              <mc:Choice xmlns:v="urn:schemas-microsoft-com:vml" Requires="v">
-                <p:oleObj name="think-cell Slide" r:id="rId3" imgW="473" imgH="473" progId="TCLayout.ActiveDocument.1">
-                  <p:embed/>
-                </p:oleObj>
-              </mc:Choice>
-              <mc:Fallback>
-                <p:oleObj name="think-cell Slide" r:id="rId3" imgW="473" imgH="473" progId="TCLayout.ActiveDocument.1">
-                  <p:embed/>
-                  <p:pic>
-                    <p:nvPicPr>
-                      <p:cNvPr id="4" name="Object 3" hidden="1">
-                        <a:extLst>
-                          <a:ext uri="{FF2B5EF4-FFF2-40B4-BE49-F238E27FC236}">
-                            <a16:creationId xmlns:a16="http://schemas.microsoft.com/office/drawing/2014/main" id="{D6C5948B-EBDC-4BC7-B296-690BCA97CA05}"/>
-                          </a:ext>
-                        </a:extLst>
-                      </p:cNvPr>
-                      <p:cNvPicPr/>
-                      <p:nvPr/>
-                    </p:nvPicPr>
-                    <p:blipFill>
-                      <a:blip r:embed="rId4"/>
-                      <a:stretch>
-                        <a:fillRect/>
-                      </a:stretch>
-                    </p:blipFill>
-                    <p:spPr>
-                      <a:xfrm>
-                        <a:off x="1588" y="1588"/>
-                        <a:ext cx="1588" cy="1588"/>
-                      </a:xfrm>
-                      <a:prstGeom prst="rect">
-                        <a:avLst/>
-                      </a:prstGeom>
-                    </p:spPr>
-                  </p:pic>
-                </p:oleObj>
-              </mc:Fallback>
-            </mc:AlternateContent>
-          </a:graphicData>
-        </a:graphic>
-      </p:graphicFrame>
-      <p:sp>
-        <p:nvSpPr>
-          <p:cNvPr id="2" name="Title 1">
-            <a:extLst>
-              <a:ext uri="{FF2B5EF4-FFF2-40B4-BE49-F238E27FC236}">
-                <a16:creationId xmlns:a16="http://schemas.microsoft.com/office/drawing/2014/main" id="{109596E1-A18E-4397-8DCE-778F5C1FB128}"/>
-              </a:ext>
-            </a:extLst>
-          </p:cNvPr>
-          <p:cNvSpPr>
-            <a:spLocks noGrp="1"/>
-          </p:cNvSpPr>
-          <p:nvPr>
-            <p:ph type="title"/>
-          </p:nvPr>
-        </p:nvSpPr>
-        <p:spPr>
-          <a:xfrm>
-            <a:off x="1141413" y="609600"/>
-            <a:ext cx="9905998" cy="686540"/>
-          </a:xfrm>
-        </p:spPr>
-        <p:txBody>
-          <a:bodyPr vert="horz">
-            <a:normAutofit fontScale="90000"/>
-          </a:bodyPr>
-          <a:lstStyle/>
-          <a:p>
-            <a:r>
-              <a:rPr lang="en-US" dirty="0"/>
-              <a:t>Bi-variate and Segmented analysis</a:t>
-            </a:r>
-          </a:p>
-        </p:txBody>
-      </p:sp>
-      <p:sp>
-        <p:nvSpPr>
-          <p:cNvPr id="6" name="TextBox 5">
-            <a:extLst>
-              <a:ext uri="{FF2B5EF4-FFF2-40B4-BE49-F238E27FC236}">
-                <a16:creationId xmlns:a16="http://schemas.microsoft.com/office/drawing/2014/main" id="{239E8D74-F2DF-D6A9-55B8-9A440D49D8D7}"/>
-              </a:ext>
-            </a:extLst>
-          </p:cNvPr>
-          <p:cNvSpPr txBox="1"/>
-          <p:nvPr/>
-        </p:nvSpPr>
-        <p:spPr>
-          <a:xfrm>
-            <a:off x="1141413" y="1828800"/>
-            <a:ext cx="10432966" cy="825867"/>
-          </a:xfrm>
-          <a:prstGeom prst="rect">
-            <a:avLst/>
-          </a:prstGeom>
-          <a:noFill/>
-        </p:spPr>
-        <p:txBody>
-          <a:bodyPr wrap="square" rtlCol="0">
-            <a:spAutoFit/>
-          </a:bodyPr>
-          <a:lstStyle/>
+              <a:t>Employment length “unknown” has a 20 percent of charged off loans.</a:t>
+            </a:r>
+            <a:endParaRPr lang="en-IN" sz="1800" dirty="0">
+              <a:solidFill>
+                <a:schemeClr val="tx1">
+                  <a:lumMod val="75000"/>
+                  <a:lumOff val="25000"/>
+                </a:schemeClr>
+              </a:solidFill>
+              <a:latin typeface="-apple-system"/>
+            </a:endParaRPr>
+          </a:p>
           <a:p>
             <a:pPr marL="91440" indent="-91440" defTabSz="914400">
               <a:lnSpc>
@@ -7618,125 +7112,20 @@
               <a:buFont typeface="Wingdings" panose="05000000000000000000" pitchFamily="2" charset="2"/>
               <a:buChar char="Ø"/>
             </a:pPr>
-            <a:r>
-              <a:rPr lang="en-US" sz="2000" dirty="0">
-                <a:solidFill>
-                  <a:schemeClr val="tx1">
-                    <a:lumMod val="75000"/>
-                    <a:lumOff val="25000"/>
-                  </a:schemeClr>
-                </a:solidFill>
-                <a:latin typeface="-apple-system"/>
-              </a:rPr>
-              <a:t>If we look into subgrades F5 and G3 have more than 40 percent charged off loans.</a:t>
-            </a:r>
-          </a:p>
-          <a:p>
-            <a:pPr marL="91440" indent="-91440" defTabSz="914400">
-              <a:lnSpc>
-                <a:spcPct val="90000"/>
-              </a:lnSpc>
-              <a:spcBef>
-                <a:spcPts val="1200"/>
-              </a:spcBef>
-              <a:spcAft>
-                <a:spcPts val="200"/>
-              </a:spcAft>
-              <a:buClr>
-                <a:schemeClr val="accent1"/>
-              </a:buClr>
-              <a:buSzPct val="100000"/>
-              <a:buFont typeface="Wingdings" panose="05000000000000000000" pitchFamily="2" charset="2"/>
-              <a:buChar char="Ø"/>
-            </a:pPr>
-            <a:r>
-              <a:rPr lang="en-US" sz="2000" dirty="0">
-                <a:solidFill>
-                  <a:schemeClr val="tx1">
-                    <a:lumMod val="75000"/>
-                    <a:lumOff val="25000"/>
-                  </a:schemeClr>
-                </a:solidFill>
-                <a:latin typeface="-apple-system"/>
-              </a:rPr>
-              <a:t>Employment length “unknown” has a 20 percent of charged off loans.</a:t>
-            </a:r>
-            <a:endParaRPr lang="en-IN" sz="2000" dirty="0">
+            <a:endParaRPr lang="en-US" b="0" i="0" dirty="0">
               <a:solidFill>
-                <a:schemeClr val="tx1">
-                  <a:lumMod val="75000"/>
-                  <a:lumOff val="25000"/>
-                </a:schemeClr>
+                <a:srgbClr val="000000"/>
               </a:solidFill>
-              <a:latin typeface="-apple-system"/>
+              <a:effectLst/>
+              <a:latin typeface="Helvetica Neue"/>
             </a:endParaRPr>
           </a:p>
         </p:txBody>
       </p:sp>
-      <p:pic>
-        <p:nvPicPr>
-          <p:cNvPr id="5" name="Picture 4">
-            <a:extLst>
-              <a:ext uri="{FF2B5EF4-FFF2-40B4-BE49-F238E27FC236}">
-                <a16:creationId xmlns:a16="http://schemas.microsoft.com/office/drawing/2014/main" id="{59AEC609-EBF5-4802-9753-899F1AD7AA89}"/>
-              </a:ext>
-            </a:extLst>
-          </p:cNvPr>
-          <p:cNvPicPr>
-            <a:picLocks noChangeAspect="1"/>
-          </p:cNvPicPr>
-          <p:nvPr/>
-        </p:nvPicPr>
-        <p:blipFill>
-          <a:blip r:embed="rId5"/>
-          <a:stretch>
-            <a:fillRect/>
-          </a:stretch>
-        </p:blipFill>
-        <p:spPr>
-          <a:xfrm>
-            <a:off x="1141413" y="2838870"/>
-            <a:ext cx="4519739" cy="3246412"/>
-          </a:xfrm>
-          <a:prstGeom prst="rect">
-            <a:avLst/>
-          </a:prstGeom>
-        </p:spPr>
-      </p:pic>
-      <p:pic>
-        <p:nvPicPr>
-          <p:cNvPr id="10" name="Picture 9">
-            <a:extLst>
-              <a:ext uri="{FF2B5EF4-FFF2-40B4-BE49-F238E27FC236}">
-                <a16:creationId xmlns:a16="http://schemas.microsoft.com/office/drawing/2014/main" id="{C9DB0DDC-09CA-0D7E-941E-DCB6D2218ACE}"/>
-              </a:ext>
-            </a:extLst>
-          </p:cNvPr>
-          <p:cNvPicPr>
-            <a:picLocks noChangeAspect="1"/>
-          </p:cNvPicPr>
-          <p:nvPr/>
-        </p:nvPicPr>
-        <p:blipFill>
-          <a:blip r:embed="rId6"/>
-          <a:stretch>
-            <a:fillRect/>
-          </a:stretch>
-        </p:blipFill>
-        <p:spPr>
-          <a:xfrm>
-            <a:off x="5767273" y="2846891"/>
-            <a:ext cx="4519739" cy="3409529"/>
-          </a:xfrm>
-          <a:prstGeom prst="rect">
-            <a:avLst/>
-          </a:prstGeom>
-        </p:spPr>
-      </p:pic>
     </p:spTree>
     <p:extLst>
       <p:ext uri="{BB962C8B-B14F-4D97-AF65-F5344CB8AC3E}">
-        <p14:creationId xmlns:p14="http://schemas.microsoft.com/office/powerpoint/2010/main" val="3877112922"/>
+        <p14:creationId xmlns:p14="http://schemas.microsoft.com/office/powerpoint/2010/main" val="1853931200"/>
       </p:ext>
     </p:extLst>
   </p:cSld>
@@ -7771,18 +7160,6 @@
 </file>
 
 <file path=ppt/tags/tag13.xml><?xml version="1.0" encoding="utf-8"?>
-<p:tagLst xmlns:a="http://schemas.openxmlformats.org/drawingml/2006/main" xmlns:r="http://schemas.openxmlformats.org/officeDocument/2006/relationships" xmlns:p="http://schemas.openxmlformats.org/presentationml/2006/main">
-  <p:tag name="THINKCELLSHAPEDONOTDELETE" val="thinkcellActiveDocDoNotDelete"/>
-</p:tagLst>
-</file>
-
-<file path=ppt/tags/tag14.xml><?xml version="1.0" encoding="utf-8"?>
-<p:tagLst xmlns:a="http://schemas.openxmlformats.org/drawingml/2006/main" xmlns:r="http://schemas.openxmlformats.org/officeDocument/2006/relationships" xmlns:p="http://schemas.openxmlformats.org/presentationml/2006/main">
-  <p:tag name="THINKCELLSHAPEDONOTDELETE" val="thinkcellActiveDocDoNotDelete"/>
-</p:tagLst>
-</file>
-
-<file path=ppt/tags/tag15.xml><?xml version="1.0" encoding="utf-8"?>
 <p:tagLst xmlns:a="http://schemas.openxmlformats.org/drawingml/2006/main" xmlns:r="http://schemas.openxmlformats.org/officeDocument/2006/relationships" xmlns:p="http://schemas.openxmlformats.org/presentationml/2006/main">
   <p:tag name="THINKCELLSHAPEDONOTDELETE" val="thinkcellActiveDocDoNotDelete"/>
 </p:tagLst>

</xml_diff>